<commit_message>
[2023-12-22] User 로그인 적용
</commit_message>
<xml_diff>
--- a/도메인 개발.pptx
+++ b/도메인 개발.pptx
@@ -7,6 +7,7 @@
   <p:sldIdLst>
     <p:sldId id="256" r:id="rId2"/>
     <p:sldId id="258" r:id="rId3"/>
+    <p:sldId id="259" r:id="rId4"/>
   </p:sldIdLst>
   <p:sldSz cx="12192000" cy="6858000"/>
   <p:notesSz cx="6858000" cy="9144000"/>
@@ -244,7 +245,7 @@
           <a:p>
             <a:fld id="{29391789-C65B-4F6D-A5DE-6155C0F6D224}" type="datetimeFigureOut">
               <a:rPr lang="ko-KR" altLang="en-US" smtClean="0"/>
-              <a:t>2023-12-14</a:t>
+              <a:t>2023-12-22</a:t>
             </a:fld>
             <a:endParaRPr lang="ko-KR" altLang="en-US"/>
           </a:p>
@@ -414,7 +415,7 @@
           <a:p>
             <a:fld id="{29391789-C65B-4F6D-A5DE-6155C0F6D224}" type="datetimeFigureOut">
               <a:rPr lang="ko-KR" altLang="en-US" smtClean="0"/>
-              <a:t>2023-12-14</a:t>
+              <a:t>2023-12-22</a:t>
             </a:fld>
             <a:endParaRPr lang="ko-KR" altLang="en-US"/>
           </a:p>
@@ -594,7 +595,7 @@
           <a:p>
             <a:fld id="{29391789-C65B-4F6D-A5DE-6155C0F6D224}" type="datetimeFigureOut">
               <a:rPr lang="ko-KR" altLang="en-US" smtClean="0"/>
-              <a:t>2023-12-14</a:t>
+              <a:t>2023-12-22</a:t>
             </a:fld>
             <a:endParaRPr lang="ko-KR" altLang="en-US"/>
           </a:p>
@@ -764,7 +765,7 @@
           <a:p>
             <a:fld id="{29391789-C65B-4F6D-A5DE-6155C0F6D224}" type="datetimeFigureOut">
               <a:rPr lang="ko-KR" altLang="en-US" smtClean="0"/>
-              <a:t>2023-12-14</a:t>
+              <a:t>2023-12-22</a:t>
             </a:fld>
             <a:endParaRPr lang="ko-KR" altLang="en-US"/>
           </a:p>
@@ -1010,7 +1011,7 @@
           <a:p>
             <a:fld id="{29391789-C65B-4F6D-A5DE-6155C0F6D224}" type="datetimeFigureOut">
               <a:rPr lang="ko-KR" altLang="en-US" smtClean="0"/>
-              <a:t>2023-12-14</a:t>
+              <a:t>2023-12-22</a:t>
             </a:fld>
             <a:endParaRPr lang="ko-KR" altLang="en-US"/>
           </a:p>
@@ -1242,7 +1243,7 @@
           <a:p>
             <a:fld id="{29391789-C65B-4F6D-A5DE-6155C0F6D224}" type="datetimeFigureOut">
               <a:rPr lang="ko-KR" altLang="en-US" smtClean="0"/>
-              <a:t>2023-12-14</a:t>
+              <a:t>2023-12-22</a:t>
             </a:fld>
             <a:endParaRPr lang="ko-KR" altLang="en-US"/>
           </a:p>
@@ -1609,7 +1610,7 @@
           <a:p>
             <a:fld id="{29391789-C65B-4F6D-A5DE-6155C0F6D224}" type="datetimeFigureOut">
               <a:rPr lang="ko-KR" altLang="en-US" smtClean="0"/>
-              <a:t>2023-12-14</a:t>
+              <a:t>2023-12-22</a:t>
             </a:fld>
             <a:endParaRPr lang="ko-KR" altLang="en-US"/>
           </a:p>
@@ -1727,7 +1728,7 @@
           <a:p>
             <a:fld id="{29391789-C65B-4F6D-A5DE-6155C0F6D224}" type="datetimeFigureOut">
               <a:rPr lang="ko-KR" altLang="en-US" smtClean="0"/>
-              <a:t>2023-12-14</a:t>
+              <a:t>2023-12-22</a:t>
             </a:fld>
             <a:endParaRPr lang="ko-KR" altLang="en-US"/>
           </a:p>
@@ -1822,7 +1823,7 @@
           <a:p>
             <a:fld id="{29391789-C65B-4F6D-A5DE-6155C0F6D224}" type="datetimeFigureOut">
               <a:rPr lang="ko-KR" altLang="en-US" smtClean="0"/>
-              <a:t>2023-12-14</a:t>
+              <a:t>2023-12-22</a:t>
             </a:fld>
             <a:endParaRPr lang="ko-KR" altLang="en-US"/>
           </a:p>
@@ -2099,7 +2100,7 @@
           <a:p>
             <a:fld id="{29391789-C65B-4F6D-A5DE-6155C0F6D224}" type="datetimeFigureOut">
               <a:rPr lang="ko-KR" altLang="en-US" smtClean="0"/>
-              <a:t>2023-12-14</a:t>
+              <a:t>2023-12-22</a:t>
             </a:fld>
             <a:endParaRPr lang="ko-KR" altLang="en-US"/>
           </a:p>
@@ -2352,7 +2353,7 @@
           <a:p>
             <a:fld id="{29391789-C65B-4F6D-A5DE-6155C0F6D224}" type="datetimeFigureOut">
               <a:rPr lang="ko-KR" altLang="en-US" smtClean="0"/>
-              <a:t>2023-12-14</a:t>
+              <a:t>2023-12-22</a:t>
             </a:fld>
             <a:endParaRPr lang="ko-KR" altLang="en-US"/>
           </a:p>
@@ -2565,7 +2566,7 @@
           <a:p>
             <a:fld id="{29391789-C65B-4F6D-A5DE-6155C0F6D224}" type="datetimeFigureOut">
               <a:rPr lang="ko-KR" altLang="en-US" smtClean="0"/>
-              <a:t>2023-12-14</a:t>
+              <a:t>2023-12-22</a:t>
             </a:fld>
             <a:endParaRPr lang="ko-KR" altLang="en-US"/>
           </a:p>
@@ -4376,6 +4377,723 @@
 </p:sld>
 </file>
 
+<file path=ppt/slides/slide3.xml><?xml version="1.0" encoding="utf-8"?>
+<p:sld xmlns:a="http://schemas.openxmlformats.org/drawingml/2006/main" xmlns:r="http://schemas.openxmlformats.org/officeDocument/2006/relationships" xmlns:p="http://schemas.openxmlformats.org/presentationml/2006/main">
+  <p:cSld>
+    <p:spTree>
+      <p:nvGrpSpPr>
+        <p:cNvPr id="1" name=""/>
+        <p:cNvGrpSpPr/>
+        <p:nvPr/>
+      </p:nvGrpSpPr>
+      <p:grpSpPr>
+        <a:xfrm>
+          <a:off x="0" y="0"/>
+          <a:ext cx="0" cy="0"/>
+          <a:chOff x="0" y="0"/>
+          <a:chExt cx="0" cy="0"/>
+        </a:xfrm>
+      </p:grpSpPr>
+      <p:sp>
+        <p:nvSpPr>
+          <p:cNvPr id="4" name="직사각형 3"/>
+          <p:cNvSpPr/>
+          <p:nvPr/>
+        </p:nvSpPr>
+        <p:spPr>
+          <a:xfrm>
+            <a:off x="861646" y="650631"/>
+            <a:ext cx="624254" cy="395654"/>
+          </a:xfrm>
+          <a:prstGeom prst="rect">
+            <a:avLst/>
+          </a:prstGeom>
+        </p:spPr>
+        <p:style>
+          <a:lnRef idx="2">
+            <a:schemeClr val="accent1">
+              <a:shade val="50000"/>
+            </a:schemeClr>
+          </a:lnRef>
+          <a:fillRef idx="1">
+            <a:schemeClr val="accent1"/>
+          </a:fillRef>
+          <a:effectRef idx="0">
+            <a:schemeClr val="accent1"/>
+          </a:effectRef>
+          <a:fontRef idx="minor">
+            <a:schemeClr val="lt1"/>
+          </a:fontRef>
+        </p:style>
+        <p:txBody>
+          <a:bodyPr rtlCol="0" anchor="ctr"/>
+          <a:lstStyle/>
+          <a:p>
+            <a:pPr algn="ctr"/>
+            <a:r>
+              <a:rPr lang="en-US" altLang="ko-KR" dirty="0" err="1" smtClean="0">
+                <a:solidFill>
+                  <a:schemeClr val="tx1"/>
+                </a:solidFill>
+              </a:rPr>
+              <a:t>req</a:t>
+            </a:r>
+            <a:endParaRPr lang="ko-KR" altLang="en-US" dirty="0">
+              <a:solidFill>
+                <a:schemeClr val="tx1"/>
+              </a:solidFill>
+            </a:endParaRPr>
+          </a:p>
+        </p:txBody>
+      </p:sp>
+      <p:sp>
+        <p:nvSpPr>
+          <p:cNvPr id="5" name="직사각형 4"/>
+          <p:cNvSpPr/>
+          <p:nvPr/>
+        </p:nvSpPr>
+        <p:spPr>
+          <a:xfrm>
+            <a:off x="861646" y="2667001"/>
+            <a:ext cx="624254" cy="395654"/>
+          </a:xfrm>
+          <a:prstGeom prst="rect">
+            <a:avLst/>
+          </a:prstGeom>
+        </p:spPr>
+        <p:style>
+          <a:lnRef idx="2">
+            <a:schemeClr val="accent1">
+              <a:shade val="50000"/>
+            </a:schemeClr>
+          </a:lnRef>
+          <a:fillRef idx="1">
+            <a:schemeClr val="accent1"/>
+          </a:fillRef>
+          <a:effectRef idx="0">
+            <a:schemeClr val="accent1"/>
+          </a:effectRef>
+          <a:fontRef idx="minor">
+            <a:schemeClr val="lt1"/>
+          </a:fontRef>
+        </p:style>
+        <p:txBody>
+          <a:bodyPr rtlCol="0" anchor="ctr"/>
+          <a:lstStyle/>
+          <a:p>
+            <a:pPr algn="ctr"/>
+            <a:r>
+              <a:rPr lang="en-US" altLang="ko-KR" dirty="0" err="1" smtClean="0">
+                <a:solidFill>
+                  <a:schemeClr val="tx1"/>
+                </a:solidFill>
+              </a:rPr>
+              <a:t>req</a:t>
+            </a:r>
+            <a:endParaRPr lang="ko-KR" altLang="en-US" dirty="0">
+              <a:solidFill>
+                <a:schemeClr val="tx1"/>
+              </a:solidFill>
+            </a:endParaRPr>
+          </a:p>
+        </p:txBody>
+      </p:sp>
+      <p:sp>
+        <p:nvSpPr>
+          <p:cNvPr id="6" name="직사각형 5"/>
+          <p:cNvSpPr/>
+          <p:nvPr/>
+        </p:nvSpPr>
+        <p:spPr>
+          <a:xfrm>
+            <a:off x="2154116" y="650631"/>
+            <a:ext cx="679938" cy="2412024"/>
+          </a:xfrm>
+          <a:prstGeom prst="rect">
+            <a:avLst/>
+          </a:prstGeom>
+        </p:spPr>
+        <p:style>
+          <a:lnRef idx="2">
+            <a:schemeClr val="accent1">
+              <a:shade val="50000"/>
+            </a:schemeClr>
+          </a:lnRef>
+          <a:fillRef idx="1">
+            <a:schemeClr val="accent1"/>
+          </a:fillRef>
+          <a:effectRef idx="0">
+            <a:schemeClr val="accent1"/>
+          </a:effectRef>
+          <a:fontRef idx="minor">
+            <a:schemeClr val="lt1"/>
+          </a:fontRef>
+        </p:style>
+        <p:txBody>
+          <a:bodyPr rtlCol="0" anchor="ctr"/>
+          <a:lstStyle/>
+          <a:p>
+            <a:pPr algn="ctr"/>
+            <a:r>
+              <a:rPr lang="en-US" altLang="ko-KR" dirty="0" smtClean="0">
+                <a:solidFill>
+                  <a:schemeClr val="tx1"/>
+                </a:solidFill>
+              </a:rPr>
+              <a:t>filter</a:t>
+            </a:r>
+            <a:endParaRPr lang="ko-KR" altLang="en-US" dirty="0">
+              <a:solidFill>
+                <a:schemeClr val="tx1"/>
+              </a:solidFill>
+            </a:endParaRPr>
+          </a:p>
+        </p:txBody>
+      </p:sp>
+      <p:sp>
+        <p:nvSpPr>
+          <p:cNvPr id="7" name="직사각형 6"/>
+          <p:cNvSpPr/>
+          <p:nvPr/>
+        </p:nvSpPr>
+        <p:spPr>
+          <a:xfrm>
+            <a:off x="3933092" y="650631"/>
+            <a:ext cx="1852246" cy="395654"/>
+          </a:xfrm>
+          <a:prstGeom prst="rect">
+            <a:avLst/>
+          </a:prstGeom>
+        </p:spPr>
+        <p:style>
+          <a:lnRef idx="2">
+            <a:schemeClr val="accent1">
+              <a:shade val="50000"/>
+            </a:schemeClr>
+          </a:lnRef>
+          <a:fillRef idx="1">
+            <a:schemeClr val="accent1"/>
+          </a:fillRef>
+          <a:effectRef idx="0">
+            <a:schemeClr val="accent1"/>
+          </a:effectRef>
+          <a:fontRef idx="minor">
+            <a:schemeClr val="lt1"/>
+          </a:fontRef>
+        </p:style>
+        <p:txBody>
+          <a:bodyPr rtlCol="0" anchor="ctr"/>
+          <a:lstStyle/>
+          <a:p>
+            <a:pPr algn="ctr"/>
+            <a:r>
+              <a:rPr lang="en-US" altLang="ko-KR" dirty="0" err="1" smtClean="0">
+                <a:solidFill>
+                  <a:schemeClr val="tx1"/>
+                </a:solidFill>
+              </a:rPr>
+              <a:t>requestServlet</a:t>
+            </a:r>
+            <a:endParaRPr lang="ko-KR" altLang="en-US" dirty="0">
+              <a:solidFill>
+                <a:schemeClr val="tx1"/>
+              </a:solidFill>
+            </a:endParaRPr>
+          </a:p>
+        </p:txBody>
+      </p:sp>
+      <p:sp>
+        <p:nvSpPr>
+          <p:cNvPr id="8" name="직사각형 7"/>
+          <p:cNvSpPr/>
+          <p:nvPr/>
+        </p:nvSpPr>
+        <p:spPr>
+          <a:xfrm>
+            <a:off x="6544407" y="650631"/>
+            <a:ext cx="1852246" cy="395654"/>
+          </a:xfrm>
+          <a:prstGeom prst="rect">
+            <a:avLst/>
+          </a:prstGeom>
+        </p:spPr>
+        <p:style>
+          <a:lnRef idx="2">
+            <a:schemeClr val="accent1">
+              <a:shade val="50000"/>
+            </a:schemeClr>
+          </a:lnRef>
+          <a:fillRef idx="1">
+            <a:schemeClr val="accent1"/>
+          </a:fillRef>
+          <a:effectRef idx="0">
+            <a:schemeClr val="accent1"/>
+          </a:effectRef>
+          <a:fontRef idx="minor">
+            <a:schemeClr val="lt1"/>
+          </a:fontRef>
+        </p:style>
+        <p:txBody>
+          <a:bodyPr rtlCol="0" anchor="ctr"/>
+          <a:lstStyle/>
+          <a:p>
+            <a:pPr algn="ctr"/>
+            <a:r>
+              <a:rPr lang="en-US" altLang="ko-KR" dirty="0" smtClean="0">
+                <a:solidFill>
+                  <a:schemeClr val="tx1"/>
+                </a:solidFill>
+              </a:rPr>
+              <a:t>handler mapper</a:t>
+            </a:r>
+            <a:endParaRPr lang="ko-KR" altLang="en-US" dirty="0">
+              <a:solidFill>
+                <a:schemeClr val="tx1"/>
+              </a:solidFill>
+            </a:endParaRPr>
+          </a:p>
+        </p:txBody>
+      </p:sp>
+      <p:sp>
+        <p:nvSpPr>
+          <p:cNvPr id="9" name="직사각형 8"/>
+          <p:cNvSpPr/>
+          <p:nvPr/>
+        </p:nvSpPr>
+        <p:spPr>
+          <a:xfrm>
+            <a:off x="5237283" y="1460989"/>
+            <a:ext cx="1852246" cy="395654"/>
+          </a:xfrm>
+          <a:prstGeom prst="rect">
+            <a:avLst/>
+          </a:prstGeom>
+        </p:spPr>
+        <p:style>
+          <a:lnRef idx="2">
+            <a:schemeClr val="accent1">
+              <a:shade val="50000"/>
+            </a:schemeClr>
+          </a:lnRef>
+          <a:fillRef idx="1">
+            <a:schemeClr val="accent1"/>
+          </a:fillRef>
+          <a:effectRef idx="0">
+            <a:schemeClr val="accent1"/>
+          </a:effectRef>
+          <a:fontRef idx="minor">
+            <a:schemeClr val="lt1"/>
+          </a:fontRef>
+        </p:style>
+        <p:txBody>
+          <a:bodyPr rtlCol="0" anchor="ctr"/>
+          <a:lstStyle/>
+          <a:p>
+            <a:pPr algn="ctr"/>
+            <a:r>
+              <a:rPr lang="en-US" altLang="ko-KR" dirty="0" smtClean="0">
+                <a:solidFill>
+                  <a:schemeClr val="tx1"/>
+                </a:solidFill>
+              </a:rPr>
+              <a:t>interceptor</a:t>
+            </a:r>
+            <a:endParaRPr lang="ko-KR" altLang="en-US" dirty="0">
+              <a:solidFill>
+                <a:schemeClr val="tx1"/>
+              </a:solidFill>
+            </a:endParaRPr>
+          </a:p>
+        </p:txBody>
+      </p:sp>
+      <p:sp>
+        <p:nvSpPr>
+          <p:cNvPr id="10" name="직사각형 9"/>
+          <p:cNvSpPr/>
+          <p:nvPr/>
+        </p:nvSpPr>
+        <p:spPr>
+          <a:xfrm>
+            <a:off x="6544407" y="2662605"/>
+            <a:ext cx="1852246" cy="395654"/>
+          </a:xfrm>
+          <a:prstGeom prst="rect">
+            <a:avLst/>
+          </a:prstGeom>
+        </p:spPr>
+        <p:style>
+          <a:lnRef idx="2">
+            <a:schemeClr val="accent1">
+              <a:shade val="50000"/>
+            </a:schemeClr>
+          </a:lnRef>
+          <a:fillRef idx="1">
+            <a:schemeClr val="accent1"/>
+          </a:fillRef>
+          <a:effectRef idx="0">
+            <a:schemeClr val="accent1"/>
+          </a:effectRef>
+          <a:fontRef idx="minor">
+            <a:schemeClr val="lt1"/>
+          </a:fontRef>
+        </p:style>
+        <p:txBody>
+          <a:bodyPr rtlCol="0" anchor="ctr"/>
+          <a:lstStyle/>
+          <a:p>
+            <a:pPr algn="ctr"/>
+            <a:r>
+              <a:rPr lang="en-US" altLang="ko-KR" dirty="0" smtClean="0">
+                <a:solidFill>
+                  <a:schemeClr val="tx1"/>
+                </a:solidFill>
+              </a:rPr>
+              <a:t>controller</a:t>
+            </a:r>
+            <a:endParaRPr lang="ko-KR" altLang="en-US" dirty="0">
+              <a:solidFill>
+                <a:schemeClr val="tx1"/>
+              </a:solidFill>
+            </a:endParaRPr>
+          </a:p>
+        </p:txBody>
+      </p:sp>
+      <p:sp>
+        <p:nvSpPr>
+          <p:cNvPr id="11" name="직사각형 10"/>
+          <p:cNvSpPr/>
+          <p:nvPr/>
+        </p:nvSpPr>
+        <p:spPr>
+          <a:xfrm>
+            <a:off x="9536722" y="3279531"/>
+            <a:ext cx="1852246" cy="395654"/>
+          </a:xfrm>
+          <a:prstGeom prst="rect">
+            <a:avLst/>
+          </a:prstGeom>
+        </p:spPr>
+        <p:style>
+          <a:lnRef idx="2">
+            <a:schemeClr val="accent1">
+              <a:shade val="50000"/>
+            </a:schemeClr>
+          </a:lnRef>
+          <a:fillRef idx="1">
+            <a:schemeClr val="accent1"/>
+          </a:fillRef>
+          <a:effectRef idx="0">
+            <a:schemeClr val="accent1"/>
+          </a:effectRef>
+          <a:fontRef idx="minor">
+            <a:schemeClr val="lt1"/>
+          </a:fontRef>
+        </p:style>
+        <p:txBody>
+          <a:bodyPr rtlCol="0" anchor="ctr"/>
+          <a:lstStyle/>
+          <a:p>
+            <a:pPr algn="ctr"/>
+            <a:r>
+              <a:rPr lang="en-US" altLang="ko-KR" dirty="0" err="1" smtClean="0">
+                <a:solidFill>
+                  <a:schemeClr val="tx1"/>
+                </a:solidFill>
+              </a:rPr>
+              <a:t>db</a:t>
+            </a:r>
+            <a:endParaRPr lang="ko-KR" altLang="en-US" dirty="0">
+              <a:solidFill>
+                <a:schemeClr val="tx1"/>
+              </a:solidFill>
+            </a:endParaRPr>
+          </a:p>
+        </p:txBody>
+      </p:sp>
+      <p:sp>
+        <p:nvSpPr>
+          <p:cNvPr id="12" name="직사각형 11"/>
+          <p:cNvSpPr/>
+          <p:nvPr/>
+        </p:nvSpPr>
+        <p:spPr>
+          <a:xfrm>
+            <a:off x="5237283" y="1968012"/>
+            <a:ext cx="1852246" cy="395654"/>
+          </a:xfrm>
+          <a:prstGeom prst="rect">
+            <a:avLst/>
+          </a:prstGeom>
+          <a:solidFill>
+            <a:srgbClr val="FFFF00"/>
+          </a:solidFill>
+        </p:spPr>
+        <p:style>
+          <a:lnRef idx="2">
+            <a:schemeClr val="accent1">
+              <a:shade val="50000"/>
+            </a:schemeClr>
+          </a:lnRef>
+          <a:fillRef idx="1">
+            <a:schemeClr val="accent1"/>
+          </a:fillRef>
+          <a:effectRef idx="0">
+            <a:schemeClr val="accent1"/>
+          </a:effectRef>
+          <a:fontRef idx="minor">
+            <a:schemeClr val="lt1"/>
+          </a:fontRef>
+        </p:style>
+        <p:txBody>
+          <a:bodyPr rtlCol="0" anchor="ctr"/>
+          <a:lstStyle/>
+          <a:p>
+            <a:pPr algn="ctr"/>
+            <a:r>
+              <a:rPr lang="en-US" altLang="ko-KR" dirty="0" smtClean="0">
+                <a:solidFill>
+                  <a:schemeClr val="tx1"/>
+                </a:solidFill>
+              </a:rPr>
+              <a:t>resolver</a:t>
+            </a:r>
+            <a:endParaRPr lang="ko-KR" altLang="en-US" dirty="0">
+              <a:solidFill>
+                <a:schemeClr val="tx1"/>
+              </a:solidFill>
+            </a:endParaRPr>
+          </a:p>
+        </p:txBody>
+      </p:sp>
+      <p:sp>
+        <p:nvSpPr>
+          <p:cNvPr id="13" name="TextBox 12"/>
+          <p:cNvSpPr txBox="1"/>
+          <p:nvPr/>
+        </p:nvSpPr>
+        <p:spPr>
+          <a:xfrm>
+            <a:off x="7470530" y="1460989"/>
+            <a:ext cx="3072380" cy="369332"/>
+          </a:xfrm>
+          <a:prstGeom prst="rect">
+            <a:avLst/>
+          </a:prstGeom>
+          <a:noFill/>
+        </p:spPr>
+        <p:txBody>
+          <a:bodyPr wrap="none" rtlCol="0">
+            <a:spAutoFit/>
+          </a:bodyPr>
+          <a:lstStyle/>
+          <a:p>
+            <a:r>
+              <a:rPr lang="en-US" altLang="ko-KR" dirty="0" err="1" smtClean="0"/>
+              <a:t>RequestContextHolder</a:t>
+            </a:r>
+            <a:r>
+              <a:rPr lang="ko-KR" altLang="en-US" dirty="0"/>
+              <a:t> </a:t>
+            </a:r>
+            <a:r>
+              <a:rPr lang="ko-KR" altLang="en-US" dirty="0" smtClean="0"/>
+              <a:t>저장</a:t>
+            </a:r>
+            <a:endParaRPr lang="ko-KR" altLang="en-US" dirty="0"/>
+          </a:p>
+        </p:txBody>
+      </p:sp>
+      <p:sp>
+        <p:nvSpPr>
+          <p:cNvPr id="14" name="TextBox 13"/>
+          <p:cNvSpPr txBox="1"/>
+          <p:nvPr/>
+        </p:nvSpPr>
+        <p:spPr>
+          <a:xfrm>
+            <a:off x="7470530" y="1981173"/>
+            <a:ext cx="3154133" cy="369332"/>
+          </a:xfrm>
+          <a:prstGeom prst="rect">
+            <a:avLst/>
+          </a:prstGeom>
+          <a:noFill/>
+        </p:spPr>
+        <p:txBody>
+          <a:bodyPr wrap="none" rtlCol="0">
+            <a:spAutoFit/>
+          </a:bodyPr>
+          <a:lstStyle/>
+          <a:p>
+            <a:r>
+              <a:rPr lang="en-US" altLang="ko-KR" dirty="0" err="1" smtClean="0"/>
+              <a:t>RequestContextHolder</a:t>
+            </a:r>
+            <a:r>
+              <a:rPr lang="ko-KR" altLang="en-US" dirty="0" smtClean="0"/>
+              <a:t> 활용</a:t>
+            </a:r>
+            <a:endParaRPr lang="ko-KR" altLang="en-US" dirty="0"/>
+          </a:p>
+        </p:txBody>
+      </p:sp>
+      <p:sp>
+        <p:nvSpPr>
+          <p:cNvPr id="15" name="직사각형 14"/>
+          <p:cNvSpPr/>
+          <p:nvPr/>
+        </p:nvSpPr>
+        <p:spPr>
+          <a:xfrm>
+            <a:off x="1758460" y="4142643"/>
+            <a:ext cx="1852246" cy="395654"/>
+          </a:xfrm>
+          <a:prstGeom prst="rect">
+            <a:avLst/>
+          </a:prstGeom>
+          <a:solidFill>
+            <a:srgbClr val="FFFF00"/>
+          </a:solidFill>
+        </p:spPr>
+        <p:style>
+          <a:lnRef idx="2">
+            <a:schemeClr val="accent1">
+              <a:shade val="50000"/>
+            </a:schemeClr>
+          </a:lnRef>
+          <a:fillRef idx="1">
+            <a:schemeClr val="accent1"/>
+          </a:fillRef>
+          <a:effectRef idx="0">
+            <a:schemeClr val="accent1"/>
+          </a:effectRef>
+          <a:fontRef idx="minor">
+            <a:schemeClr val="lt1"/>
+          </a:fontRef>
+        </p:style>
+        <p:txBody>
+          <a:bodyPr rtlCol="0" anchor="ctr"/>
+          <a:lstStyle/>
+          <a:p>
+            <a:pPr algn="ctr"/>
+            <a:r>
+              <a:rPr lang="en-US" altLang="ko-KR" dirty="0" smtClean="0">
+                <a:solidFill>
+                  <a:schemeClr val="tx1"/>
+                </a:solidFill>
+              </a:rPr>
+              <a:t>annotation</a:t>
+            </a:r>
+            <a:endParaRPr lang="ko-KR" altLang="en-US" dirty="0">
+              <a:solidFill>
+                <a:schemeClr val="tx1"/>
+              </a:solidFill>
+            </a:endParaRPr>
+          </a:p>
+        </p:txBody>
+      </p:sp>
+      <p:sp>
+        <p:nvSpPr>
+          <p:cNvPr id="16" name="TextBox 15"/>
+          <p:cNvSpPr txBox="1"/>
+          <p:nvPr/>
+        </p:nvSpPr>
+        <p:spPr>
+          <a:xfrm>
+            <a:off x="1858876" y="4538297"/>
+            <a:ext cx="1651414" cy="369332"/>
+          </a:xfrm>
+          <a:prstGeom prst="rect">
+            <a:avLst/>
+          </a:prstGeom>
+          <a:noFill/>
+        </p:spPr>
+        <p:txBody>
+          <a:bodyPr wrap="none" rtlCol="0">
+            <a:spAutoFit/>
+          </a:bodyPr>
+          <a:lstStyle/>
+          <a:p>
+            <a:r>
+              <a:rPr lang="en-US" altLang="ko-KR" dirty="0" smtClean="0"/>
+              <a:t>@</a:t>
+            </a:r>
+            <a:r>
+              <a:rPr lang="en-US" altLang="ko-KR" dirty="0" err="1" smtClean="0"/>
+              <a:t>UserSession</a:t>
+            </a:r>
+            <a:endParaRPr lang="en-US" altLang="ko-KR" dirty="0" smtClean="0"/>
+          </a:p>
+        </p:txBody>
+      </p:sp>
+      <p:sp>
+        <p:nvSpPr>
+          <p:cNvPr id="17" name="직사각형 16"/>
+          <p:cNvSpPr/>
+          <p:nvPr/>
+        </p:nvSpPr>
+        <p:spPr>
+          <a:xfrm>
+            <a:off x="4728796" y="4722963"/>
+            <a:ext cx="2113083" cy="395654"/>
+          </a:xfrm>
+          <a:prstGeom prst="rect">
+            <a:avLst/>
+          </a:prstGeom>
+          <a:solidFill>
+            <a:srgbClr val="FF0000"/>
+          </a:solidFill>
+        </p:spPr>
+        <p:style>
+          <a:lnRef idx="2">
+            <a:schemeClr val="accent1">
+              <a:shade val="50000"/>
+            </a:schemeClr>
+          </a:lnRef>
+          <a:fillRef idx="1">
+            <a:schemeClr val="accent1"/>
+          </a:fillRef>
+          <a:effectRef idx="0">
+            <a:schemeClr val="accent1"/>
+          </a:effectRef>
+          <a:fontRef idx="minor">
+            <a:schemeClr val="lt1"/>
+          </a:fontRef>
+        </p:style>
+        <p:txBody>
+          <a:bodyPr rtlCol="0" anchor="ctr"/>
+          <a:lstStyle/>
+          <a:p>
+            <a:pPr algn="ctr"/>
+            <a:r>
+              <a:rPr lang="en-US" altLang="ko-KR" dirty="0" err="1" smtClean="0">
+                <a:solidFill>
+                  <a:schemeClr val="tx1"/>
+                </a:solidFill>
+              </a:rPr>
+              <a:t>WebConfig</a:t>
+            </a:r>
+            <a:endParaRPr lang="ko-KR" altLang="en-US" dirty="0">
+              <a:solidFill>
+                <a:schemeClr val="tx1"/>
+              </a:solidFill>
+            </a:endParaRPr>
+          </a:p>
+        </p:txBody>
+      </p:sp>
+    </p:spTree>
+    <p:extLst>
+      <p:ext uri="{BB962C8B-B14F-4D97-AF65-F5344CB8AC3E}">
+        <p14:creationId xmlns:p14="http://schemas.microsoft.com/office/powerpoint/2010/main" val="2684064141"/>
+      </p:ext>
+    </p:extLst>
+  </p:cSld>
+  <p:clrMapOvr>
+    <a:masterClrMapping/>
+  </p:clrMapOvr>
+</p:sld>
+</file>
+
 <file path=ppt/theme/theme1.xml><?xml version="1.0" encoding="utf-8"?>
 <a:theme xmlns:a="http://schemas.openxmlformats.org/drawingml/2006/main" name="Office 테마">
   <a:themeElements>

</xml_diff>

<commit_message>
[2023-12-22] store 도메인 개발
</commit_message>
<xml_diff>
--- a/도메인 개발.pptx
+++ b/도메인 개발.pptx
@@ -8,6 +8,8 @@
     <p:sldId id="256" r:id="rId2"/>
     <p:sldId id="258" r:id="rId3"/>
     <p:sldId id="259" r:id="rId4"/>
+    <p:sldId id="260" r:id="rId5"/>
+    <p:sldId id="261" r:id="rId6"/>
   </p:sldIdLst>
   <p:sldSz cx="12192000" cy="6858000"/>
   <p:notesSz cx="6858000" cy="9144000"/>
@@ -5094,6 +5096,881 @@
 </p:sld>
 </file>
 
+<file path=ppt/slides/slide4.xml><?xml version="1.0" encoding="utf-8"?>
+<p:sld xmlns:a="http://schemas.openxmlformats.org/drawingml/2006/main" xmlns:r="http://schemas.openxmlformats.org/officeDocument/2006/relationships" xmlns:p="http://schemas.openxmlformats.org/presentationml/2006/main">
+  <p:cSld>
+    <p:spTree>
+      <p:nvGrpSpPr>
+        <p:cNvPr id="1" name=""/>
+        <p:cNvGrpSpPr/>
+        <p:nvPr/>
+      </p:nvGrpSpPr>
+      <p:grpSpPr>
+        <a:xfrm>
+          <a:off x="0" y="0"/>
+          <a:ext cx="0" cy="0"/>
+          <a:chOff x="0" y="0"/>
+          <a:chExt cx="0" cy="0"/>
+        </a:xfrm>
+      </p:grpSpPr>
+      <p:sp>
+        <p:nvSpPr>
+          <p:cNvPr id="4" name="TextBox 3"/>
+          <p:cNvSpPr txBox="1"/>
+          <p:nvPr/>
+        </p:nvSpPr>
+        <p:spPr>
+          <a:xfrm>
+            <a:off x="641838" y="483577"/>
+            <a:ext cx="2194832" cy="369332"/>
+          </a:xfrm>
+          <a:prstGeom prst="rect">
+            <a:avLst/>
+          </a:prstGeom>
+          <a:noFill/>
+        </p:spPr>
+        <p:txBody>
+          <a:bodyPr wrap="none" rtlCol="0">
+            <a:spAutoFit/>
+          </a:bodyPr>
+          <a:lstStyle/>
+          <a:p>
+            <a:r>
+              <a:rPr lang="ko-KR" altLang="en-US" dirty="0" smtClean="0"/>
+              <a:t>스토어 도메인 개발</a:t>
+            </a:r>
+            <a:endParaRPr lang="ko-KR" altLang="en-US" dirty="0"/>
+          </a:p>
+        </p:txBody>
+      </p:sp>
+      <p:sp>
+        <p:nvSpPr>
+          <p:cNvPr id="6" name="직사각형 5"/>
+          <p:cNvSpPr/>
+          <p:nvPr/>
+        </p:nvSpPr>
+        <p:spPr>
+          <a:xfrm>
+            <a:off x="791308" y="993531"/>
+            <a:ext cx="3903784" cy="4633546"/>
+          </a:xfrm>
+          <a:prstGeom prst="rect">
+            <a:avLst/>
+          </a:prstGeom>
+        </p:spPr>
+        <p:style>
+          <a:lnRef idx="2">
+            <a:schemeClr val="accent1">
+              <a:shade val="50000"/>
+            </a:schemeClr>
+          </a:lnRef>
+          <a:fillRef idx="1">
+            <a:schemeClr val="accent1"/>
+          </a:fillRef>
+          <a:effectRef idx="0">
+            <a:schemeClr val="accent1"/>
+          </a:effectRef>
+          <a:fontRef idx="minor">
+            <a:schemeClr val="lt1"/>
+          </a:fontRef>
+        </p:style>
+        <p:txBody>
+          <a:bodyPr rtlCol="0" anchor="ctr"/>
+          <a:lstStyle/>
+          <a:p>
+            <a:pPr algn="ctr"/>
+            <a:r>
+              <a:rPr lang="en-US" altLang="ko-KR" dirty="0" smtClean="0"/>
+              <a:t>store</a:t>
+            </a:r>
+          </a:p>
+          <a:p>
+            <a:pPr algn="ctr"/>
+            <a:r>
+              <a:rPr lang="en-US" altLang="ko-KR" dirty="0" smtClean="0"/>
+              <a:t>id </a:t>
+            </a:r>
+            <a:r>
+              <a:rPr lang="en-US" altLang="ko-KR" dirty="0" err="1" smtClean="0"/>
+              <a:t>bigint</a:t>
+            </a:r>
+            <a:r>
+              <a:rPr lang="en-US" altLang="ko-KR" dirty="0" smtClean="0"/>
+              <a:t>(32) </a:t>
+            </a:r>
+            <a:r>
+              <a:rPr lang="en-US" altLang="ko-KR" dirty="0" err="1" smtClean="0"/>
+              <a:t>ai</a:t>
+            </a:r>
+            <a:r>
+              <a:rPr lang="en-US" altLang="ko-KR" dirty="0"/>
+              <a:t> </a:t>
+            </a:r>
+            <a:r>
+              <a:rPr lang="en-US" altLang="ko-KR" dirty="0" err="1" smtClean="0"/>
+              <a:t>pk</a:t>
+            </a:r>
+            <a:r>
+              <a:rPr lang="en-US" altLang="ko-KR" dirty="0" smtClean="0"/>
+              <a:t>,</a:t>
+            </a:r>
+          </a:p>
+          <a:p>
+            <a:pPr algn="ctr"/>
+            <a:r>
+              <a:rPr lang="en-US" altLang="ko-KR" dirty="0" smtClean="0"/>
+              <a:t>name varchar(100) </a:t>
+            </a:r>
+            <a:r>
+              <a:rPr lang="en-US" altLang="ko-KR" dirty="0" err="1" smtClean="0"/>
+              <a:t>nn</a:t>
+            </a:r>
+            <a:r>
+              <a:rPr lang="en-US" altLang="ko-KR" dirty="0" smtClean="0"/>
+              <a:t>,</a:t>
+            </a:r>
+          </a:p>
+          <a:p>
+            <a:pPr algn="ctr"/>
+            <a:r>
+              <a:rPr lang="en-US" altLang="ko-KR" dirty="0" smtClean="0"/>
+              <a:t>address varchar(100) </a:t>
+            </a:r>
+            <a:r>
+              <a:rPr lang="en-US" altLang="ko-KR" dirty="0" err="1" smtClean="0"/>
+              <a:t>nn</a:t>
+            </a:r>
+            <a:r>
+              <a:rPr lang="en-US" altLang="ko-KR" dirty="0" smtClean="0"/>
+              <a:t>,</a:t>
+            </a:r>
+          </a:p>
+          <a:p>
+            <a:pPr algn="ctr"/>
+            <a:r>
+              <a:rPr lang="en-US" altLang="ko-KR" dirty="0" smtClean="0"/>
+              <a:t>status varchar(50) </a:t>
+            </a:r>
+            <a:r>
+              <a:rPr lang="en-US" altLang="ko-KR" dirty="0" err="1" smtClean="0"/>
+              <a:t>nn</a:t>
+            </a:r>
+            <a:r>
+              <a:rPr lang="en-US" altLang="ko-KR" dirty="0" smtClean="0"/>
+              <a:t>,</a:t>
+            </a:r>
+          </a:p>
+          <a:p>
+            <a:pPr algn="ctr"/>
+            <a:r>
+              <a:rPr lang="en-US" altLang="ko-KR" dirty="0" smtClean="0"/>
+              <a:t>category varchar(50) </a:t>
+            </a:r>
+            <a:r>
+              <a:rPr lang="en-US" altLang="ko-KR" dirty="0" err="1" smtClean="0"/>
+              <a:t>nn</a:t>
+            </a:r>
+            <a:r>
+              <a:rPr lang="en-US" altLang="ko-KR" dirty="0" smtClean="0"/>
+              <a:t>,</a:t>
+            </a:r>
+          </a:p>
+          <a:p>
+            <a:pPr algn="ctr"/>
+            <a:r>
+              <a:rPr lang="en-US" altLang="ko-KR" dirty="0" smtClean="0"/>
+              <a:t>star double 0,</a:t>
+            </a:r>
+          </a:p>
+          <a:p>
+            <a:pPr algn="ctr"/>
+            <a:r>
+              <a:rPr lang="en-US" altLang="ko-KR" dirty="0" err="1" smtClean="0"/>
+              <a:t>thumbnail_url</a:t>
+            </a:r>
+            <a:r>
+              <a:rPr lang="en-US" altLang="ko-KR" dirty="0" smtClean="0"/>
+              <a:t> varchar(200) </a:t>
+            </a:r>
+            <a:r>
+              <a:rPr lang="en-US" altLang="ko-KR" dirty="0" err="1" smtClean="0"/>
+              <a:t>nn</a:t>
+            </a:r>
+            <a:r>
+              <a:rPr lang="en-US" altLang="ko-KR" dirty="0" smtClean="0"/>
+              <a:t>,</a:t>
+            </a:r>
+          </a:p>
+          <a:p>
+            <a:pPr algn="ctr"/>
+            <a:r>
+              <a:rPr lang="en-US" altLang="ko-KR" dirty="0" err="1" smtClean="0"/>
+              <a:t>minimum_amount</a:t>
+            </a:r>
+            <a:r>
+              <a:rPr lang="en-US" altLang="ko-KR" dirty="0" smtClean="0"/>
+              <a:t> </a:t>
+            </a:r>
+            <a:r>
+              <a:rPr lang="en-US" altLang="ko-KR" dirty="0" err="1" smtClean="0"/>
+              <a:t>demical</a:t>
+            </a:r>
+            <a:r>
+              <a:rPr lang="en-US" altLang="ko-KR" dirty="0" smtClean="0"/>
+              <a:t>(11,4)</a:t>
+            </a:r>
+          </a:p>
+          <a:p>
+            <a:pPr algn="ctr"/>
+            <a:r>
+              <a:rPr lang="en-US" altLang="ko-KR" dirty="0" err="1" smtClean="0"/>
+              <a:t>minimum_delivery_amount</a:t>
+            </a:r>
+            <a:r>
+              <a:rPr lang="en-US" altLang="ko-KR" dirty="0" smtClean="0"/>
+              <a:t> </a:t>
+            </a:r>
+            <a:r>
+              <a:rPr lang="en-US" altLang="ko-KR" dirty="0" err="1" smtClean="0"/>
+              <a:t>demical</a:t>
+            </a:r>
+            <a:r>
+              <a:rPr lang="en-US" altLang="ko-KR" dirty="0" smtClean="0"/>
+              <a:t>(11,4), </a:t>
+            </a:r>
+          </a:p>
+          <a:p>
+            <a:pPr algn="ctr"/>
+            <a:r>
+              <a:rPr lang="en-US" altLang="ko-KR" dirty="0" err="1" smtClean="0"/>
+              <a:t>phone_number</a:t>
+            </a:r>
+            <a:r>
+              <a:rPr lang="en-US" altLang="ko-KR" dirty="0" smtClean="0"/>
+              <a:t> varchar(20) </a:t>
+            </a:r>
+            <a:r>
+              <a:rPr lang="en-US" altLang="ko-KR" dirty="0" err="1" smtClean="0"/>
+              <a:t>nn</a:t>
+            </a:r>
+            <a:endParaRPr lang="ko-KR" altLang="en-US" dirty="0"/>
+          </a:p>
+        </p:txBody>
+      </p:sp>
+      <p:sp>
+        <p:nvSpPr>
+          <p:cNvPr id="7" name="직사각형 6"/>
+          <p:cNvSpPr/>
+          <p:nvPr/>
+        </p:nvSpPr>
+        <p:spPr>
+          <a:xfrm>
+            <a:off x="4894385" y="1448278"/>
+            <a:ext cx="6096000" cy="1815882"/>
+          </a:xfrm>
+          <a:prstGeom prst="rect">
+            <a:avLst/>
+          </a:prstGeom>
+        </p:spPr>
+        <p:txBody>
+          <a:bodyPr>
+            <a:spAutoFit/>
+          </a:bodyPr>
+          <a:lstStyle/>
+          <a:p>
+            <a:r>
+              <a:rPr lang="en-US" altLang="ko-KR" sz="1400" dirty="0"/>
+              <a:t>CREATE TABLE store ( id BIGINT(32) AUTO_INCREMENT PRIMARY KEY, name VARCHAR(100) NOT NULL, address VARCHAR(100) NOT NULL, status ENUM('REGISTERED', 'UNREGISTERED') NOT NULL, category ENUM('CHINESE_FOOD', 'WESTERN_FOOD', 'JAPANESE_FOOD', 'CHICKEN', 'PIZZA', 'HAMBURGER', 'COFFEE_TEA') NOT NULL, star DOUBLE DEFAULT 0, </a:t>
+            </a:r>
+            <a:r>
+              <a:rPr lang="en-US" altLang="ko-KR" sz="1400" dirty="0" err="1"/>
+              <a:t>thumbnail_url</a:t>
+            </a:r>
+            <a:r>
+              <a:rPr lang="en-US" altLang="ko-KR" sz="1400" dirty="0"/>
+              <a:t> VARCHAR(200) NOT NULL, </a:t>
+            </a:r>
+            <a:r>
+              <a:rPr lang="en-US" altLang="ko-KR" sz="1400" dirty="0" err="1"/>
+              <a:t>minimum_amount</a:t>
+            </a:r>
+            <a:r>
+              <a:rPr lang="en-US" altLang="ko-KR" sz="1400" dirty="0"/>
+              <a:t> DECIMAL(11,4), </a:t>
+            </a:r>
+            <a:r>
+              <a:rPr lang="en-US" altLang="ko-KR" sz="1400" dirty="0" err="1"/>
+              <a:t>minimum_delivery_amount</a:t>
+            </a:r>
+            <a:r>
+              <a:rPr lang="en-US" altLang="ko-KR" sz="1400" dirty="0"/>
+              <a:t> DECIMAL(11,4), </a:t>
+            </a:r>
+            <a:r>
+              <a:rPr lang="en-US" altLang="ko-KR" sz="1400" dirty="0" err="1"/>
+              <a:t>phone_number</a:t>
+            </a:r>
+            <a:r>
+              <a:rPr lang="en-US" altLang="ko-KR" sz="1400" dirty="0"/>
+              <a:t> VARCHAR(20) NOT NULL );</a:t>
+            </a:r>
+            <a:endParaRPr lang="ko-KR" altLang="en-US" sz="900" dirty="0"/>
+          </a:p>
+        </p:txBody>
+      </p:sp>
+    </p:spTree>
+    <p:extLst>
+      <p:ext uri="{BB962C8B-B14F-4D97-AF65-F5344CB8AC3E}">
+        <p14:creationId xmlns:p14="http://schemas.microsoft.com/office/powerpoint/2010/main" val="1025363517"/>
+      </p:ext>
+    </p:extLst>
+  </p:cSld>
+  <p:clrMapOvr>
+    <a:masterClrMapping/>
+  </p:clrMapOvr>
+</p:sld>
+</file>
+
+<file path=ppt/slides/slide5.xml><?xml version="1.0" encoding="utf-8"?>
+<p:sld xmlns:a="http://schemas.openxmlformats.org/drawingml/2006/main" xmlns:r="http://schemas.openxmlformats.org/officeDocument/2006/relationships" xmlns:p="http://schemas.openxmlformats.org/presentationml/2006/main">
+  <p:cSld>
+    <p:spTree>
+      <p:nvGrpSpPr>
+        <p:cNvPr id="1" name=""/>
+        <p:cNvGrpSpPr/>
+        <p:nvPr/>
+      </p:nvGrpSpPr>
+      <p:grpSpPr>
+        <a:xfrm>
+          <a:off x="0" y="0"/>
+          <a:ext cx="0" cy="0"/>
+          <a:chOff x="0" y="0"/>
+          <a:chExt cx="0" cy="0"/>
+        </a:xfrm>
+      </p:grpSpPr>
+      <p:sp>
+        <p:nvSpPr>
+          <p:cNvPr id="4" name="TextBox 3"/>
+          <p:cNvSpPr txBox="1"/>
+          <p:nvPr/>
+        </p:nvSpPr>
+        <p:spPr>
+          <a:xfrm>
+            <a:off x="879231" y="483577"/>
+            <a:ext cx="1963999" cy="369332"/>
+          </a:xfrm>
+          <a:prstGeom prst="rect">
+            <a:avLst/>
+          </a:prstGeom>
+          <a:noFill/>
+        </p:spPr>
+        <p:txBody>
+          <a:bodyPr wrap="none" rtlCol="0">
+            <a:spAutoFit/>
+          </a:bodyPr>
+          <a:lstStyle/>
+          <a:p>
+            <a:r>
+              <a:rPr lang="ko-KR" altLang="en-US" dirty="0" smtClean="0"/>
+              <a:t>상품 도메인 개발</a:t>
+            </a:r>
+            <a:endParaRPr lang="ko-KR" altLang="en-US" dirty="0"/>
+          </a:p>
+        </p:txBody>
+      </p:sp>
+      <p:sp>
+        <p:nvSpPr>
+          <p:cNvPr id="5" name="직사각형 4"/>
+          <p:cNvSpPr/>
+          <p:nvPr/>
+        </p:nvSpPr>
+        <p:spPr>
+          <a:xfrm>
+            <a:off x="879230" y="1142999"/>
+            <a:ext cx="3402624" cy="3376247"/>
+          </a:xfrm>
+          <a:prstGeom prst="rect">
+            <a:avLst/>
+          </a:prstGeom>
+        </p:spPr>
+        <p:style>
+          <a:lnRef idx="2">
+            <a:schemeClr val="accent1">
+              <a:shade val="50000"/>
+            </a:schemeClr>
+          </a:lnRef>
+          <a:fillRef idx="1">
+            <a:schemeClr val="accent1"/>
+          </a:fillRef>
+          <a:effectRef idx="0">
+            <a:schemeClr val="accent1"/>
+          </a:effectRef>
+          <a:fontRef idx="minor">
+            <a:schemeClr val="lt1"/>
+          </a:fontRef>
+        </p:style>
+        <p:txBody>
+          <a:bodyPr rtlCol="0" anchor="ctr"/>
+          <a:lstStyle/>
+          <a:p>
+            <a:pPr algn="ctr"/>
+            <a:r>
+              <a:rPr lang="en-US" altLang="ko-KR" dirty="0" err="1" smtClean="0"/>
+              <a:t>store_menu</a:t>
+            </a:r>
+            <a:endParaRPr lang="en-US" altLang="ko-KR" dirty="0" smtClean="0"/>
+          </a:p>
+          <a:p>
+            <a:pPr algn="ctr"/>
+            <a:r>
+              <a:rPr lang="en-US" altLang="ko-KR" dirty="0" smtClean="0"/>
+              <a:t>id </a:t>
+            </a:r>
+            <a:r>
+              <a:rPr lang="en-US" altLang="ko-KR" dirty="0" err="1" smtClean="0"/>
+              <a:t>bigint</a:t>
+            </a:r>
+            <a:r>
+              <a:rPr lang="en-US" altLang="ko-KR" dirty="0" smtClean="0"/>
+              <a:t>(32) </a:t>
+            </a:r>
+            <a:r>
+              <a:rPr lang="en-US" altLang="ko-KR" dirty="0" err="1" smtClean="0"/>
+              <a:t>ai</a:t>
+            </a:r>
+            <a:r>
+              <a:rPr lang="en-US" altLang="ko-KR" dirty="0" smtClean="0"/>
+              <a:t> </a:t>
+            </a:r>
+            <a:r>
+              <a:rPr lang="en-US" altLang="ko-KR" dirty="0" err="1" smtClean="0"/>
+              <a:t>pk</a:t>
+            </a:r>
+            <a:endParaRPr lang="en-US" altLang="ko-KR" dirty="0" smtClean="0"/>
+          </a:p>
+          <a:p>
+            <a:pPr algn="ctr"/>
+            <a:r>
+              <a:rPr lang="en-US" altLang="ko-KR" dirty="0" err="1" smtClean="0"/>
+              <a:t>store_id</a:t>
+            </a:r>
+            <a:r>
+              <a:rPr lang="en-US" altLang="ko-KR" dirty="0" smtClean="0"/>
+              <a:t> </a:t>
+            </a:r>
+            <a:r>
+              <a:rPr lang="en-US" altLang="ko-KR" dirty="0" err="1" smtClean="0"/>
+              <a:t>bigint</a:t>
+            </a:r>
+            <a:r>
+              <a:rPr lang="en-US" altLang="ko-KR" dirty="0" smtClean="0"/>
+              <a:t> </a:t>
+            </a:r>
+            <a:r>
+              <a:rPr lang="en-US" altLang="ko-KR" dirty="0" err="1" smtClean="0"/>
+              <a:t>fk</a:t>
+            </a:r>
+            <a:r>
+              <a:rPr lang="en-US" altLang="ko-KR" dirty="0" smtClean="0"/>
+              <a:t>(store(id) ) </a:t>
+            </a:r>
+            <a:r>
+              <a:rPr lang="en-US" altLang="ko-KR" dirty="0" err="1" smtClean="0"/>
+              <a:t>nn</a:t>
+            </a:r>
+            <a:endParaRPr lang="en-US" altLang="ko-KR" dirty="0" smtClean="0"/>
+          </a:p>
+          <a:p>
+            <a:pPr algn="ctr"/>
+            <a:r>
+              <a:rPr lang="en-US" altLang="ko-KR" dirty="0" smtClean="0"/>
+              <a:t>name varchar(100) </a:t>
+            </a:r>
+            <a:r>
+              <a:rPr lang="en-US" altLang="ko-KR" dirty="0" err="1" smtClean="0"/>
+              <a:t>nn</a:t>
+            </a:r>
+            <a:endParaRPr lang="en-US" altLang="ko-KR" dirty="0" smtClean="0"/>
+          </a:p>
+          <a:p>
+            <a:pPr algn="ctr"/>
+            <a:r>
+              <a:rPr lang="en-US" altLang="ko-KR" dirty="0" smtClean="0"/>
+              <a:t>amount decimal(11,4) </a:t>
+            </a:r>
+            <a:r>
+              <a:rPr lang="en-US" altLang="ko-KR" dirty="0" err="1" smtClean="0"/>
+              <a:t>nn</a:t>
+            </a:r>
+            <a:endParaRPr lang="en-US" altLang="ko-KR" dirty="0" smtClean="0"/>
+          </a:p>
+          <a:p>
+            <a:pPr algn="ctr"/>
+            <a:r>
+              <a:rPr lang="en-US" altLang="ko-KR" dirty="0" smtClean="0"/>
+              <a:t>status varchar(50) </a:t>
+            </a:r>
+            <a:r>
+              <a:rPr lang="en-US" altLang="ko-KR" dirty="0" err="1" smtClean="0"/>
+              <a:t>nn</a:t>
+            </a:r>
+            <a:endParaRPr lang="en-US" altLang="ko-KR" dirty="0" smtClean="0"/>
+          </a:p>
+          <a:p>
+            <a:pPr algn="ctr"/>
+            <a:r>
+              <a:rPr lang="en-US" altLang="ko-KR" dirty="0" err="1" smtClean="0"/>
+              <a:t>thumbnail_url</a:t>
+            </a:r>
+            <a:r>
+              <a:rPr lang="en-US" altLang="ko-KR" dirty="0" smtClean="0"/>
+              <a:t> varchar(200) </a:t>
+            </a:r>
+            <a:r>
+              <a:rPr lang="en-US" altLang="ko-KR" dirty="0" err="1" smtClean="0"/>
+              <a:t>nn</a:t>
+            </a:r>
+            <a:endParaRPr lang="en-US" altLang="ko-KR" dirty="0" smtClean="0"/>
+          </a:p>
+          <a:p>
+            <a:pPr algn="ctr"/>
+            <a:r>
+              <a:rPr lang="en-US" altLang="ko-KR" dirty="0" err="1" smtClean="0"/>
+              <a:t>like_count</a:t>
+            </a:r>
+            <a:r>
+              <a:rPr lang="en-US" altLang="ko-KR" dirty="0" smtClean="0"/>
+              <a:t> </a:t>
+            </a:r>
+            <a:r>
+              <a:rPr lang="en-US" altLang="ko-KR" dirty="0" err="1" smtClean="0"/>
+              <a:t>int</a:t>
+            </a:r>
+            <a:r>
+              <a:rPr lang="en-US" altLang="ko-KR" dirty="0" smtClean="0"/>
+              <a:t> 0</a:t>
+            </a:r>
+          </a:p>
+          <a:p>
+            <a:pPr algn="ctr"/>
+            <a:r>
+              <a:rPr lang="en-US" altLang="ko-KR" dirty="0" smtClean="0"/>
+              <a:t>sequence </a:t>
+            </a:r>
+            <a:r>
+              <a:rPr lang="en-US" altLang="ko-KR" dirty="0" err="1" smtClean="0"/>
+              <a:t>int</a:t>
+            </a:r>
+            <a:r>
+              <a:rPr lang="en-US" altLang="ko-KR" dirty="0" smtClean="0"/>
+              <a:t> 0</a:t>
+            </a:r>
+          </a:p>
+          <a:p>
+            <a:pPr algn="ctr"/>
+            <a:endParaRPr lang="ko-KR" altLang="en-US" dirty="0"/>
+          </a:p>
+        </p:txBody>
+      </p:sp>
+      <p:sp>
+        <p:nvSpPr>
+          <p:cNvPr id="6" name="직사각형 5"/>
+          <p:cNvSpPr/>
+          <p:nvPr/>
+        </p:nvSpPr>
+        <p:spPr>
+          <a:xfrm>
+            <a:off x="5316415" y="1142999"/>
+            <a:ext cx="6096000" cy="3139321"/>
+          </a:xfrm>
+          <a:prstGeom prst="rect">
+            <a:avLst/>
+          </a:prstGeom>
+        </p:spPr>
+        <p:txBody>
+          <a:bodyPr>
+            <a:spAutoFit/>
+          </a:bodyPr>
+          <a:lstStyle/>
+          <a:p>
+            <a:r>
+              <a:rPr lang="ko-KR" altLang="en-US" dirty="0"/>
+              <a:t>CREATE TABLE </a:t>
+            </a:r>
+            <a:r>
+              <a:rPr lang="ko-KR" altLang="en-US" dirty="0" err="1"/>
+              <a:t>store_menu</a:t>
+            </a:r>
+            <a:r>
+              <a:rPr lang="ko-KR" altLang="en-US" dirty="0"/>
+              <a:t> (</a:t>
+            </a:r>
+          </a:p>
+          <a:p>
+            <a:r>
+              <a:rPr lang="ko-KR" altLang="en-US" dirty="0"/>
+              <a:t>    </a:t>
+            </a:r>
+            <a:r>
+              <a:rPr lang="ko-KR" altLang="en-US" dirty="0" err="1"/>
+              <a:t>id</a:t>
+            </a:r>
+            <a:r>
+              <a:rPr lang="ko-KR" altLang="en-US" dirty="0"/>
+              <a:t> BIGINT(32) AUTO_INCREMENT PRIMARY KEY,</a:t>
+            </a:r>
+          </a:p>
+          <a:p>
+            <a:r>
+              <a:rPr lang="ko-KR" altLang="en-US" dirty="0"/>
+              <a:t>    </a:t>
+            </a:r>
+            <a:r>
+              <a:rPr lang="ko-KR" altLang="en-US" dirty="0" err="1"/>
+              <a:t>store_id</a:t>
+            </a:r>
+            <a:r>
+              <a:rPr lang="ko-KR" altLang="en-US" dirty="0"/>
+              <a:t> BIGINT(32) NOT NULL,</a:t>
+            </a:r>
+          </a:p>
+          <a:p>
+            <a:r>
+              <a:rPr lang="ko-KR" altLang="en-US" dirty="0"/>
+              <a:t>    </a:t>
+            </a:r>
+            <a:r>
+              <a:rPr lang="ko-KR" altLang="en-US" dirty="0" err="1"/>
+              <a:t>name</a:t>
+            </a:r>
+            <a:r>
+              <a:rPr lang="ko-KR" altLang="en-US" dirty="0"/>
+              <a:t> VARCHAR(100) NOT NULL,</a:t>
+            </a:r>
+          </a:p>
+          <a:p>
+            <a:r>
+              <a:rPr lang="ko-KR" altLang="en-US" dirty="0"/>
+              <a:t>    </a:t>
+            </a:r>
+            <a:r>
+              <a:rPr lang="ko-KR" altLang="en-US" dirty="0" err="1"/>
+              <a:t>amount</a:t>
+            </a:r>
+            <a:r>
+              <a:rPr lang="ko-KR" altLang="en-US" dirty="0"/>
+              <a:t> DECIMAL(11,4) NOT NULL,</a:t>
+            </a:r>
+          </a:p>
+          <a:p>
+            <a:r>
+              <a:rPr lang="ko-KR" altLang="en-US" dirty="0"/>
+              <a:t>    </a:t>
+            </a:r>
+            <a:r>
+              <a:rPr lang="ko-KR" altLang="en-US" dirty="0" err="1"/>
+              <a:t>status</a:t>
+            </a:r>
+            <a:r>
+              <a:rPr lang="ko-KR" altLang="en-US" dirty="0"/>
+              <a:t> VARCHAR(50) NOT NULL,</a:t>
+            </a:r>
+          </a:p>
+          <a:p>
+            <a:r>
+              <a:rPr lang="ko-KR" altLang="en-US" dirty="0"/>
+              <a:t>    </a:t>
+            </a:r>
+            <a:r>
+              <a:rPr lang="ko-KR" altLang="en-US" dirty="0" err="1"/>
+              <a:t>thumbnail_url</a:t>
+            </a:r>
+            <a:r>
+              <a:rPr lang="ko-KR" altLang="en-US" dirty="0"/>
+              <a:t> VARCHAR(200) NOT NULL,</a:t>
+            </a:r>
+          </a:p>
+          <a:p>
+            <a:r>
+              <a:rPr lang="ko-KR" altLang="en-US" dirty="0"/>
+              <a:t>    </a:t>
+            </a:r>
+            <a:r>
+              <a:rPr lang="ko-KR" altLang="en-US" dirty="0" err="1"/>
+              <a:t>like_count</a:t>
+            </a:r>
+            <a:r>
+              <a:rPr lang="ko-KR" altLang="en-US" dirty="0"/>
+              <a:t> INT DEFAULT 0,</a:t>
+            </a:r>
+          </a:p>
+          <a:p>
+            <a:r>
+              <a:rPr lang="ko-KR" altLang="en-US" dirty="0"/>
+              <a:t>    </a:t>
+            </a:r>
+            <a:r>
+              <a:rPr lang="ko-KR" altLang="en-US" dirty="0" err="1"/>
+              <a:t>sequence</a:t>
+            </a:r>
+            <a:r>
+              <a:rPr lang="ko-KR" altLang="en-US" dirty="0"/>
+              <a:t> INT DEFAULT 0,</a:t>
+            </a:r>
+          </a:p>
+          <a:p>
+            <a:r>
+              <a:rPr lang="ko-KR" altLang="en-US" dirty="0"/>
+              <a:t>    </a:t>
+            </a:r>
+            <a:r>
+              <a:rPr lang="en-US" altLang="ko-KR" dirty="0" smtClean="0"/>
+              <a:t>--</a:t>
+            </a:r>
+            <a:r>
+              <a:rPr lang="ko-KR" altLang="en-US" dirty="0" smtClean="0"/>
+              <a:t>FOREIGN </a:t>
+            </a:r>
+            <a:r>
+              <a:rPr lang="ko-KR" altLang="en-US" dirty="0"/>
+              <a:t>KEY (</a:t>
+            </a:r>
+            <a:r>
+              <a:rPr lang="ko-KR" altLang="en-US" dirty="0" err="1"/>
+              <a:t>store_id</a:t>
+            </a:r>
+            <a:r>
+              <a:rPr lang="ko-KR" altLang="en-US" dirty="0"/>
+              <a:t>) REFERENCES </a:t>
+            </a:r>
+            <a:r>
+              <a:rPr lang="ko-KR" altLang="en-US" dirty="0" err="1"/>
+              <a:t>store</a:t>
+            </a:r>
+            <a:r>
+              <a:rPr lang="ko-KR" altLang="en-US" dirty="0"/>
+              <a:t>(</a:t>
+            </a:r>
+            <a:r>
+              <a:rPr lang="ko-KR" altLang="en-US" dirty="0" err="1"/>
+              <a:t>id</a:t>
+            </a:r>
+            <a:r>
+              <a:rPr lang="ko-KR" altLang="en-US" dirty="0"/>
+              <a:t>)</a:t>
+            </a:r>
+          </a:p>
+          <a:p>
+            <a:r>
+              <a:rPr lang="ko-KR" altLang="en-US" dirty="0"/>
+              <a:t>);</a:t>
+            </a:r>
+          </a:p>
+        </p:txBody>
+      </p:sp>
+      <p:sp>
+        <p:nvSpPr>
+          <p:cNvPr id="7" name="TextBox 6"/>
+          <p:cNvSpPr txBox="1"/>
+          <p:nvPr/>
+        </p:nvSpPr>
+        <p:spPr>
+          <a:xfrm>
+            <a:off x="5316415" y="5512778"/>
+            <a:ext cx="2482987" cy="369332"/>
+          </a:xfrm>
+          <a:prstGeom prst="rect">
+            <a:avLst/>
+          </a:prstGeom>
+          <a:noFill/>
+        </p:spPr>
+        <p:txBody>
+          <a:bodyPr wrap="none" rtlCol="0">
+            <a:spAutoFit/>
+          </a:bodyPr>
+          <a:lstStyle/>
+          <a:p>
+            <a:r>
+              <a:rPr lang="en-US" altLang="ko-KR" dirty="0" err="1" smtClean="0"/>
+              <a:t>idx_store_id</a:t>
+            </a:r>
+            <a:r>
+              <a:rPr lang="en-US" altLang="ko-KR" dirty="0" smtClean="0"/>
+              <a:t> </a:t>
+            </a:r>
+            <a:r>
+              <a:rPr lang="ko-KR" altLang="en-US" dirty="0" smtClean="0"/>
+              <a:t>추가 생성</a:t>
+            </a:r>
+            <a:endParaRPr lang="ko-KR" altLang="en-US" dirty="0"/>
+          </a:p>
+        </p:txBody>
+      </p:sp>
+      <p:sp>
+        <p:nvSpPr>
+          <p:cNvPr id="8" name="직사각형 7"/>
+          <p:cNvSpPr/>
+          <p:nvPr/>
+        </p:nvSpPr>
+        <p:spPr>
+          <a:xfrm>
+            <a:off x="5316415" y="5882110"/>
+            <a:ext cx="5816849" cy="369332"/>
+          </a:xfrm>
+          <a:prstGeom prst="rect">
+            <a:avLst/>
+          </a:prstGeom>
+        </p:spPr>
+        <p:txBody>
+          <a:bodyPr wrap="none">
+            <a:spAutoFit/>
+          </a:bodyPr>
+          <a:lstStyle/>
+          <a:p>
+            <a:r>
+              <a:rPr lang="ko-KR" altLang="en-US" dirty="0"/>
+              <a:t>CREATE INDEX </a:t>
+            </a:r>
+            <a:r>
+              <a:rPr lang="ko-KR" altLang="en-US" dirty="0" err="1"/>
+              <a:t>idx_store_id</a:t>
+            </a:r>
+            <a:r>
+              <a:rPr lang="ko-KR" altLang="en-US" dirty="0"/>
+              <a:t> ON </a:t>
+            </a:r>
+            <a:r>
+              <a:rPr lang="ko-KR" altLang="en-US" dirty="0" err="1"/>
+              <a:t>store_menu</a:t>
+            </a:r>
+            <a:r>
+              <a:rPr lang="ko-KR" altLang="en-US" dirty="0"/>
+              <a:t> (</a:t>
+            </a:r>
+            <a:r>
+              <a:rPr lang="ko-KR" altLang="en-US" dirty="0" err="1"/>
+              <a:t>store_id</a:t>
+            </a:r>
+            <a:r>
+              <a:rPr lang="ko-KR" altLang="en-US" dirty="0"/>
+              <a:t>);</a:t>
+            </a:r>
+          </a:p>
+        </p:txBody>
+      </p:sp>
+    </p:spTree>
+    <p:extLst>
+      <p:ext uri="{BB962C8B-B14F-4D97-AF65-F5344CB8AC3E}">
+        <p14:creationId xmlns:p14="http://schemas.microsoft.com/office/powerpoint/2010/main" val="1756667318"/>
+      </p:ext>
+    </p:extLst>
+  </p:cSld>
+  <p:clrMapOvr>
+    <a:masterClrMapping/>
+  </p:clrMapOvr>
+</p:sld>
+</file>
+
 <file path=ppt/theme/theme1.xml><?xml version="1.0" encoding="utf-8"?>
 <a:theme xmlns:a="http://schemas.openxmlformats.org/drawingml/2006/main" name="Office 테마">
   <a:themeElements>

</xml_diff>

<commit_message>
[2023-12-22] 상품 메뉴 개발
</commit_message>
<xml_diff>
--- a/도메인 개발.pptx
+++ b/도메인 개발.pptx
@@ -5681,7 +5681,7 @@
         <p:spPr>
           <a:xfrm>
             <a:off x="5316415" y="1142999"/>
-            <a:ext cx="6096000" cy="3139321"/>
+            <a:ext cx="6096000" cy="3416320"/>
           </a:xfrm>
           <a:prstGeom prst="rect">
             <a:avLst/>
@@ -5765,16 +5765,17 @@
           <a:p>
             <a:r>
               <a:rPr lang="ko-KR" altLang="en-US" dirty="0"/>
-              <a:t>    </a:t>
-            </a:r>
-            <a:r>
-              <a:rPr lang="ko-KR" altLang="en-US" dirty="0" err="1"/>
-              <a:t>status</a:t>
-            </a:r>
-            <a:r>
-              <a:rPr lang="ko-KR" altLang="en-US" dirty="0"/>
-              <a:t> VARCHAR(50) NOT NULL,</a:t>
-            </a:r>
+              <a:t> </a:t>
+            </a:r>
+            <a:r>
+              <a:rPr lang="en-US" altLang="ko-KR" dirty="0"/>
+              <a:t>status ENUM('REGISTERED', 'UNREGISTERED') NOT NULL</a:t>
+            </a:r>
+            <a:r>
+              <a:rPr lang="ko-KR" altLang="en-US" dirty="0" smtClean="0"/>
+              <a:t>,</a:t>
+            </a:r>
+            <a:endParaRPr lang="ko-KR" altLang="en-US" dirty="0"/>
           </a:p>
           <a:p>
             <a:r>

</xml_diff>

<commit_message>
[2023-12-22] UserOrder/UserOrderMenu 테이블 진행-3
</commit_message>
<xml_diff>
--- a/도메인 개발.pptx
+++ b/도메인 개발.pptx
@@ -10,6 +10,7 @@
     <p:sldId id="259" r:id="rId4"/>
     <p:sldId id="260" r:id="rId5"/>
     <p:sldId id="261" r:id="rId6"/>
+    <p:sldId id="262" r:id="rId7"/>
   </p:sldIdLst>
   <p:sldSz cx="12192000" cy="6858000"/>
   <p:notesSz cx="6858000" cy="9144000"/>
@@ -5972,6 +5973,1164 @@
 </p:sld>
 </file>
 
+<file path=ppt/slides/slide6.xml><?xml version="1.0" encoding="utf-8"?>
+<p:sld xmlns:a="http://schemas.openxmlformats.org/drawingml/2006/main" xmlns:r="http://schemas.openxmlformats.org/officeDocument/2006/relationships" xmlns:p="http://schemas.openxmlformats.org/presentationml/2006/main">
+  <p:cSld>
+    <p:spTree>
+      <p:nvGrpSpPr>
+        <p:cNvPr id="1" name=""/>
+        <p:cNvGrpSpPr/>
+        <p:nvPr/>
+      </p:nvGrpSpPr>
+      <p:grpSpPr>
+        <a:xfrm>
+          <a:off x="0" y="0"/>
+          <a:ext cx="0" cy="0"/>
+          <a:chOff x="0" y="0"/>
+          <a:chExt cx="0" cy="0"/>
+        </a:xfrm>
+      </p:grpSpPr>
+      <p:sp>
+        <p:nvSpPr>
+          <p:cNvPr id="4" name="TextBox 3"/>
+          <p:cNvSpPr txBox="1"/>
+          <p:nvPr/>
+        </p:nvSpPr>
+        <p:spPr>
+          <a:xfrm>
+            <a:off x="817685" y="536331"/>
+            <a:ext cx="1733167" cy="369332"/>
+          </a:xfrm>
+          <a:prstGeom prst="rect">
+            <a:avLst/>
+          </a:prstGeom>
+          <a:noFill/>
+        </p:spPr>
+        <p:txBody>
+          <a:bodyPr wrap="none" rtlCol="0">
+            <a:spAutoFit/>
+          </a:bodyPr>
+          <a:lstStyle/>
+          <a:p>
+            <a:r>
+              <a:rPr lang="ko-KR" altLang="en-US" dirty="0" smtClean="0"/>
+              <a:t>상품 주문 개발</a:t>
+            </a:r>
+            <a:endParaRPr lang="ko-KR" altLang="en-US" dirty="0"/>
+          </a:p>
+        </p:txBody>
+      </p:sp>
+      <p:sp>
+        <p:nvSpPr>
+          <p:cNvPr id="5" name="직사각형 4"/>
+          <p:cNvSpPr/>
+          <p:nvPr/>
+        </p:nvSpPr>
+        <p:spPr>
+          <a:xfrm>
+            <a:off x="914399" y="1178170"/>
+            <a:ext cx="4721470" cy="2013438"/>
+          </a:xfrm>
+          <a:prstGeom prst="rect">
+            <a:avLst/>
+          </a:prstGeom>
+        </p:spPr>
+        <p:style>
+          <a:lnRef idx="2">
+            <a:schemeClr val="accent1">
+              <a:shade val="50000"/>
+            </a:schemeClr>
+          </a:lnRef>
+          <a:fillRef idx="1">
+            <a:schemeClr val="accent1"/>
+          </a:fillRef>
+          <a:effectRef idx="0">
+            <a:schemeClr val="accent1"/>
+          </a:effectRef>
+          <a:fontRef idx="minor">
+            <a:schemeClr val="lt1"/>
+          </a:fontRef>
+        </p:style>
+        <p:txBody>
+          <a:bodyPr rtlCol="0" anchor="ctr"/>
+          <a:lstStyle/>
+          <a:p>
+            <a:pPr algn="ctr"/>
+            <a:r>
+              <a:rPr lang="en-US" altLang="ko-KR" dirty="0" err="1" smtClean="0">
+                <a:solidFill>
+                  <a:schemeClr val="tx1"/>
+                </a:solidFill>
+              </a:rPr>
+              <a:t>user_order</a:t>
+            </a:r>
+            <a:endParaRPr lang="en-US" altLang="ko-KR" dirty="0" smtClean="0">
+              <a:solidFill>
+                <a:schemeClr val="tx1"/>
+              </a:solidFill>
+            </a:endParaRPr>
+          </a:p>
+          <a:p>
+            <a:pPr algn="ctr"/>
+            <a:r>
+              <a:rPr lang="en-US" altLang="ko-KR" dirty="0" smtClean="0">
+                <a:solidFill>
+                  <a:schemeClr val="tx1"/>
+                </a:solidFill>
+              </a:rPr>
+              <a:t>id </a:t>
+            </a:r>
+            <a:r>
+              <a:rPr lang="en-US" altLang="ko-KR" dirty="0" err="1" smtClean="0">
+                <a:solidFill>
+                  <a:schemeClr val="tx1"/>
+                </a:solidFill>
+              </a:rPr>
+              <a:t>bigint</a:t>
+            </a:r>
+            <a:r>
+              <a:rPr lang="en-US" altLang="ko-KR" dirty="0" smtClean="0">
+                <a:solidFill>
+                  <a:schemeClr val="tx1"/>
+                </a:solidFill>
+              </a:rPr>
+              <a:t>(32) </a:t>
+            </a:r>
+            <a:r>
+              <a:rPr lang="en-US" altLang="ko-KR" dirty="0" err="1" smtClean="0">
+                <a:solidFill>
+                  <a:schemeClr val="tx1"/>
+                </a:solidFill>
+              </a:rPr>
+              <a:t>ai</a:t>
+            </a:r>
+            <a:r>
+              <a:rPr lang="en-US" altLang="ko-KR" dirty="0" smtClean="0">
+                <a:solidFill>
+                  <a:schemeClr val="tx1"/>
+                </a:solidFill>
+              </a:rPr>
+              <a:t> </a:t>
+            </a:r>
+            <a:r>
+              <a:rPr lang="en-US" altLang="ko-KR" dirty="0" err="1" smtClean="0">
+                <a:solidFill>
+                  <a:schemeClr val="tx1"/>
+                </a:solidFill>
+              </a:rPr>
+              <a:t>pk</a:t>
+            </a:r>
+            <a:endParaRPr lang="en-US" altLang="ko-KR" dirty="0" smtClean="0">
+              <a:solidFill>
+                <a:schemeClr val="tx1"/>
+              </a:solidFill>
+            </a:endParaRPr>
+          </a:p>
+          <a:p>
+            <a:pPr algn="ctr"/>
+            <a:r>
+              <a:rPr lang="en-US" altLang="ko-KR" dirty="0" err="1" smtClean="0">
+                <a:solidFill>
+                  <a:schemeClr val="tx1"/>
+                </a:solidFill>
+              </a:rPr>
+              <a:t>user_id</a:t>
+            </a:r>
+            <a:r>
+              <a:rPr lang="en-US" altLang="ko-KR" dirty="0" smtClean="0">
+                <a:solidFill>
+                  <a:schemeClr val="tx1"/>
+                </a:solidFill>
+              </a:rPr>
+              <a:t> </a:t>
+            </a:r>
+            <a:r>
+              <a:rPr lang="en-US" altLang="ko-KR" dirty="0" err="1" smtClean="0">
+                <a:solidFill>
+                  <a:schemeClr val="tx1"/>
+                </a:solidFill>
+              </a:rPr>
+              <a:t>bigint</a:t>
+            </a:r>
+            <a:r>
+              <a:rPr lang="en-US" altLang="ko-KR" dirty="0" smtClean="0">
+                <a:solidFill>
+                  <a:schemeClr val="tx1"/>
+                </a:solidFill>
+              </a:rPr>
+              <a:t>(32) </a:t>
+            </a:r>
+            <a:r>
+              <a:rPr lang="en-US" altLang="ko-KR" dirty="0" err="1" smtClean="0">
+                <a:solidFill>
+                  <a:schemeClr val="tx1"/>
+                </a:solidFill>
+              </a:rPr>
+              <a:t>nn</a:t>
+            </a:r>
+            <a:r>
+              <a:rPr lang="en-US" altLang="ko-KR" dirty="0" smtClean="0">
+                <a:solidFill>
+                  <a:schemeClr val="tx1"/>
+                </a:solidFill>
+              </a:rPr>
+              <a:t> </a:t>
+            </a:r>
+            <a:r>
+              <a:rPr lang="en-US" altLang="ko-KR" dirty="0" err="1" smtClean="0">
+                <a:solidFill>
+                  <a:schemeClr val="tx1"/>
+                </a:solidFill>
+              </a:rPr>
+              <a:t>fk</a:t>
+            </a:r>
+            <a:r>
+              <a:rPr lang="en-US" altLang="ko-KR" dirty="0" smtClean="0">
+                <a:solidFill>
+                  <a:schemeClr val="tx1"/>
+                </a:solidFill>
+              </a:rPr>
+              <a:t>(user(id))</a:t>
+            </a:r>
+          </a:p>
+          <a:p>
+            <a:pPr algn="ctr"/>
+            <a:r>
+              <a:rPr lang="en-US" altLang="ko-KR" dirty="0" smtClean="0">
+                <a:solidFill>
+                  <a:schemeClr val="tx1"/>
+                </a:solidFill>
+              </a:rPr>
+              <a:t>status varchar(50) </a:t>
+            </a:r>
+            <a:r>
+              <a:rPr lang="en-US" altLang="ko-KR" dirty="0" err="1" smtClean="0">
+                <a:solidFill>
+                  <a:schemeClr val="tx1"/>
+                </a:solidFill>
+              </a:rPr>
+              <a:t>nn</a:t>
+            </a:r>
+            <a:endParaRPr lang="en-US" altLang="ko-KR" dirty="0" smtClean="0">
+              <a:solidFill>
+                <a:schemeClr val="tx1"/>
+              </a:solidFill>
+            </a:endParaRPr>
+          </a:p>
+          <a:p>
+            <a:pPr algn="ctr"/>
+            <a:r>
+              <a:rPr lang="en-US" altLang="ko-KR" dirty="0" smtClean="0">
+                <a:solidFill>
+                  <a:schemeClr val="tx1"/>
+                </a:solidFill>
+              </a:rPr>
+              <a:t>amount decimal(11,4) </a:t>
+            </a:r>
+            <a:r>
+              <a:rPr lang="en-US" altLang="ko-KR" dirty="0" err="1" smtClean="0">
+                <a:solidFill>
+                  <a:schemeClr val="tx1"/>
+                </a:solidFill>
+              </a:rPr>
+              <a:t>nn</a:t>
+            </a:r>
+            <a:endParaRPr lang="en-US" altLang="ko-KR" dirty="0" smtClean="0">
+              <a:solidFill>
+                <a:schemeClr val="tx1"/>
+              </a:solidFill>
+            </a:endParaRPr>
+          </a:p>
+          <a:p>
+            <a:pPr algn="ctr"/>
+            <a:r>
+              <a:rPr lang="en-US" altLang="ko-KR" dirty="0" err="1" smtClean="0">
+                <a:solidFill>
+                  <a:schemeClr val="tx1"/>
+                </a:solidFill>
+              </a:rPr>
+              <a:t>ordered_at</a:t>
+            </a:r>
+            <a:r>
+              <a:rPr lang="en-US" altLang="ko-KR" dirty="0" smtClean="0">
+                <a:solidFill>
+                  <a:schemeClr val="tx1"/>
+                </a:solidFill>
+              </a:rPr>
+              <a:t> </a:t>
+            </a:r>
+            <a:r>
+              <a:rPr lang="en-US" altLang="ko-KR" dirty="0" err="1" smtClean="0">
+                <a:solidFill>
+                  <a:schemeClr val="tx1"/>
+                </a:solidFill>
+              </a:rPr>
+              <a:t>Datetime</a:t>
+            </a:r>
+            <a:endParaRPr lang="en-US" altLang="ko-KR" dirty="0" smtClean="0">
+              <a:solidFill>
+                <a:schemeClr val="tx1"/>
+              </a:solidFill>
+            </a:endParaRPr>
+          </a:p>
+          <a:p>
+            <a:pPr algn="ctr"/>
+            <a:r>
+              <a:rPr lang="en-US" altLang="ko-KR" dirty="0" err="1" smtClean="0">
+                <a:solidFill>
+                  <a:schemeClr val="tx1"/>
+                </a:solidFill>
+              </a:rPr>
+              <a:t>accepted_at</a:t>
+            </a:r>
+            <a:r>
+              <a:rPr lang="en-US" altLang="ko-KR" dirty="0" smtClean="0">
+                <a:solidFill>
+                  <a:schemeClr val="tx1"/>
+                </a:solidFill>
+              </a:rPr>
+              <a:t> </a:t>
+            </a:r>
+            <a:r>
+              <a:rPr lang="en-US" altLang="ko-KR" dirty="0" err="1" smtClean="0">
+                <a:solidFill>
+                  <a:schemeClr val="tx1"/>
+                </a:solidFill>
+              </a:rPr>
+              <a:t>Datetime</a:t>
+            </a:r>
+            <a:endParaRPr lang="en-US" altLang="ko-KR" dirty="0" smtClean="0">
+              <a:solidFill>
+                <a:schemeClr val="tx1"/>
+              </a:solidFill>
+            </a:endParaRPr>
+          </a:p>
+          <a:p>
+            <a:pPr algn="ctr"/>
+            <a:r>
+              <a:rPr lang="en-US" altLang="ko-KR" dirty="0" err="1" smtClean="0">
+                <a:solidFill>
+                  <a:schemeClr val="tx1"/>
+                </a:solidFill>
+              </a:rPr>
+              <a:t>cooking_started_at</a:t>
+            </a:r>
+            <a:r>
+              <a:rPr lang="en-US" altLang="ko-KR" dirty="0" smtClean="0">
+                <a:solidFill>
+                  <a:schemeClr val="tx1"/>
+                </a:solidFill>
+              </a:rPr>
+              <a:t> </a:t>
+            </a:r>
+            <a:r>
+              <a:rPr lang="en-US" altLang="ko-KR" dirty="0" err="1" smtClean="0">
+                <a:solidFill>
+                  <a:schemeClr val="tx1"/>
+                </a:solidFill>
+              </a:rPr>
+              <a:t>Datetime</a:t>
+            </a:r>
+            <a:endParaRPr lang="en-US" altLang="ko-KR" dirty="0" smtClean="0">
+              <a:solidFill>
+                <a:schemeClr val="tx1"/>
+              </a:solidFill>
+            </a:endParaRPr>
+          </a:p>
+          <a:p>
+            <a:pPr algn="ctr"/>
+            <a:r>
+              <a:rPr lang="en-US" altLang="ko-KR" dirty="0" err="1" smtClean="0">
+                <a:solidFill>
+                  <a:schemeClr val="tx1"/>
+                </a:solidFill>
+              </a:rPr>
+              <a:t>delivery_started_at</a:t>
+            </a:r>
+            <a:r>
+              <a:rPr lang="en-US" altLang="ko-KR" dirty="0" smtClean="0">
+                <a:solidFill>
+                  <a:schemeClr val="tx1"/>
+                </a:solidFill>
+              </a:rPr>
+              <a:t> </a:t>
+            </a:r>
+            <a:r>
+              <a:rPr lang="en-US" altLang="ko-KR" dirty="0" err="1" smtClean="0">
+                <a:solidFill>
+                  <a:schemeClr val="tx1"/>
+                </a:solidFill>
+              </a:rPr>
+              <a:t>Datetime</a:t>
+            </a:r>
+            <a:endParaRPr lang="en-US" altLang="ko-KR" dirty="0" smtClean="0">
+              <a:solidFill>
+                <a:schemeClr val="tx1"/>
+              </a:solidFill>
+            </a:endParaRPr>
+          </a:p>
+          <a:p>
+            <a:pPr algn="ctr"/>
+            <a:r>
+              <a:rPr lang="en-US" altLang="ko-KR" dirty="0" err="1" smtClean="0">
+                <a:solidFill>
+                  <a:schemeClr val="tx1"/>
+                </a:solidFill>
+              </a:rPr>
+              <a:t>received_at</a:t>
+            </a:r>
+            <a:r>
+              <a:rPr lang="en-US" altLang="ko-KR" dirty="0" smtClean="0">
+                <a:solidFill>
+                  <a:schemeClr val="tx1"/>
+                </a:solidFill>
+              </a:rPr>
+              <a:t> </a:t>
+            </a:r>
+            <a:r>
+              <a:rPr lang="en-US" altLang="ko-KR" dirty="0" err="1" smtClean="0">
+                <a:solidFill>
+                  <a:schemeClr val="tx1"/>
+                </a:solidFill>
+              </a:rPr>
+              <a:t>Datetime</a:t>
+            </a:r>
+            <a:endParaRPr lang="en-US" altLang="ko-KR" dirty="0" smtClean="0">
+              <a:solidFill>
+                <a:schemeClr val="tx1"/>
+              </a:solidFill>
+            </a:endParaRPr>
+          </a:p>
+          <a:p>
+            <a:pPr algn="ctr"/>
+            <a:endParaRPr lang="ko-KR" altLang="en-US" dirty="0">
+              <a:solidFill>
+                <a:schemeClr val="tx1"/>
+              </a:solidFill>
+            </a:endParaRPr>
+          </a:p>
+        </p:txBody>
+      </p:sp>
+      <p:sp>
+        <p:nvSpPr>
+          <p:cNvPr id="6" name="직사각형 5"/>
+          <p:cNvSpPr/>
+          <p:nvPr/>
+        </p:nvSpPr>
+        <p:spPr>
+          <a:xfrm>
+            <a:off x="914399" y="5011615"/>
+            <a:ext cx="4686300" cy="1389185"/>
+          </a:xfrm>
+          <a:prstGeom prst="rect">
+            <a:avLst/>
+          </a:prstGeom>
+        </p:spPr>
+        <p:style>
+          <a:lnRef idx="2">
+            <a:schemeClr val="accent1">
+              <a:shade val="50000"/>
+            </a:schemeClr>
+          </a:lnRef>
+          <a:fillRef idx="1">
+            <a:schemeClr val="accent1"/>
+          </a:fillRef>
+          <a:effectRef idx="0">
+            <a:schemeClr val="accent1"/>
+          </a:effectRef>
+          <a:fontRef idx="minor">
+            <a:schemeClr val="lt1"/>
+          </a:fontRef>
+        </p:style>
+        <p:txBody>
+          <a:bodyPr rtlCol="0" anchor="ctr"/>
+          <a:lstStyle/>
+          <a:p>
+            <a:pPr algn="ctr"/>
+            <a:r>
+              <a:rPr lang="en-US" altLang="ko-KR" dirty="0" err="1" smtClean="0">
+                <a:solidFill>
+                  <a:schemeClr val="tx1"/>
+                </a:solidFill>
+              </a:rPr>
+              <a:t>user_order_menu</a:t>
+            </a:r>
+            <a:endParaRPr lang="en-US" altLang="ko-KR" dirty="0" smtClean="0">
+              <a:solidFill>
+                <a:schemeClr val="tx1"/>
+              </a:solidFill>
+            </a:endParaRPr>
+          </a:p>
+          <a:p>
+            <a:pPr algn="ctr"/>
+            <a:r>
+              <a:rPr lang="en-US" altLang="ko-KR" dirty="0" smtClean="0">
+                <a:solidFill>
+                  <a:schemeClr val="tx1"/>
+                </a:solidFill>
+              </a:rPr>
+              <a:t>id </a:t>
+            </a:r>
+            <a:r>
+              <a:rPr lang="en-US" altLang="ko-KR" dirty="0" err="1" smtClean="0">
+                <a:solidFill>
+                  <a:schemeClr val="tx1"/>
+                </a:solidFill>
+              </a:rPr>
+              <a:t>bigint</a:t>
+            </a:r>
+            <a:r>
+              <a:rPr lang="en-US" altLang="ko-KR" dirty="0" smtClean="0">
+                <a:solidFill>
+                  <a:schemeClr val="tx1"/>
+                </a:solidFill>
+              </a:rPr>
+              <a:t>(32) </a:t>
+            </a:r>
+            <a:r>
+              <a:rPr lang="en-US" altLang="ko-KR" dirty="0" err="1" smtClean="0">
+                <a:solidFill>
+                  <a:schemeClr val="tx1"/>
+                </a:solidFill>
+              </a:rPr>
+              <a:t>ai</a:t>
+            </a:r>
+            <a:r>
+              <a:rPr lang="en-US" altLang="ko-KR" dirty="0" smtClean="0">
+                <a:solidFill>
+                  <a:schemeClr val="tx1"/>
+                </a:solidFill>
+              </a:rPr>
+              <a:t> </a:t>
+            </a:r>
+            <a:r>
+              <a:rPr lang="en-US" altLang="ko-KR" dirty="0" err="1" smtClean="0">
+                <a:solidFill>
+                  <a:schemeClr val="tx1"/>
+                </a:solidFill>
+              </a:rPr>
+              <a:t>pk</a:t>
+            </a:r>
+            <a:endParaRPr lang="en-US" altLang="ko-KR" dirty="0" smtClean="0">
+              <a:solidFill>
+                <a:schemeClr val="tx1"/>
+              </a:solidFill>
+            </a:endParaRPr>
+          </a:p>
+          <a:p>
+            <a:pPr algn="ctr"/>
+            <a:r>
+              <a:rPr lang="en-US" altLang="ko-KR" dirty="0" err="1" smtClean="0">
+                <a:solidFill>
+                  <a:schemeClr val="tx1"/>
+                </a:solidFill>
+              </a:rPr>
+              <a:t>user_order_id</a:t>
+            </a:r>
+            <a:r>
+              <a:rPr lang="en-US" altLang="ko-KR" dirty="0" smtClean="0">
+                <a:solidFill>
+                  <a:schemeClr val="tx1"/>
+                </a:solidFill>
+              </a:rPr>
+              <a:t> </a:t>
+            </a:r>
+            <a:r>
+              <a:rPr lang="en-US" altLang="ko-KR" dirty="0" err="1" smtClean="0">
+                <a:solidFill>
+                  <a:schemeClr val="tx1"/>
+                </a:solidFill>
+              </a:rPr>
+              <a:t>bigint</a:t>
+            </a:r>
+            <a:r>
+              <a:rPr lang="en-US" altLang="ko-KR" dirty="0" smtClean="0">
+                <a:solidFill>
+                  <a:schemeClr val="tx1"/>
+                </a:solidFill>
+              </a:rPr>
+              <a:t>(32) </a:t>
+            </a:r>
+            <a:r>
+              <a:rPr lang="en-US" altLang="ko-KR" dirty="0" err="1" smtClean="0">
+                <a:solidFill>
+                  <a:schemeClr val="tx1"/>
+                </a:solidFill>
+              </a:rPr>
+              <a:t>fk</a:t>
+            </a:r>
+            <a:r>
+              <a:rPr lang="en-US" altLang="ko-KR" dirty="0" smtClean="0">
+                <a:solidFill>
+                  <a:schemeClr val="tx1"/>
+                </a:solidFill>
+              </a:rPr>
+              <a:t>(</a:t>
+            </a:r>
+            <a:r>
+              <a:rPr lang="en-US" altLang="ko-KR" dirty="0" err="1" smtClean="0">
+                <a:solidFill>
+                  <a:schemeClr val="tx1"/>
+                </a:solidFill>
+              </a:rPr>
+              <a:t>user_order</a:t>
+            </a:r>
+            <a:r>
+              <a:rPr lang="en-US" altLang="ko-KR" dirty="0" smtClean="0">
+                <a:solidFill>
+                  <a:schemeClr val="tx1"/>
+                </a:solidFill>
+              </a:rPr>
+              <a:t>(id))</a:t>
+            </a:r>
+          </a:p>
+          <a:p>
+            <a:pPr algn="ctr"/>
+            <a:r>
+              <a:rPr lang="en-US" altLang="ko-KR" dirty="0" err="1" smtClean="0">
+                <a:solidFill>
+                  <a:schemeClr val="tx1"/>
+                </a:solidFill>
+              </a:rPr>
+              <a:t>store_menu_id</a:t>
+            </a:r>
+            <a:r>
+              <a:rPr lang="en-US" altLang="ko-KR" dirty="0" smtClean="0">
+                <a:solidFill>
+                  <a:schemeClr val="tx1"/>
+                </a:solidFill>
+              </a:rPr>
+              <a:t> </a:t>
+            </a:r>
+            <a:r>
+              <a:rPr lang="en-US" altLang="ko-KR" dirty="0" err="1" smtClean="0">
+                <a:solidFill>
+                  <a:schemeClr val="tx1"/>
+                </a:solidFill>
+              </a:rPr>
+              <a:t>bigint</a:t>
+            </a:r>
+            <a:r>
+              <a:rPr lang="en-US" altLang="ko-KR" dirty="0" smtClean="0">
+                <a:solidFill>
+                  <a:schemeClr val="tx1"/>
+                </a:solidFill>
+              </a:rPr>
+              <a:t>(32) </a:t>
+            </a:r>
+            <a:r>
+              <a:rPr lang="en-US" altLang="ko-KR" dirty="0" err="1" smtClean="0">
+                <a:solidFill>
+                  <a:schemeClr val="tx1"/>
+                </a:solidFill>
+              </a:rPr>
+              <a:t>fk</a:t>
+            </a:r>
+            <a:r>
+              <a:rPr lang="en-US" altLang="ko-KR" dirty="0" smtClean="0">
+                <a:solidFill>
+                  <a:schemeClr val="tx1"/>
+                </a:solidFill>
+              </a:rPr>
+              <a:t>(</a:t>
+            </a:r>
+            <a:r>
+              <a:rPr lang="en-US" altLang="ko-KR" dirty="0" err="1" smtClean="0">
+                <a:solidFill>
+                  <a:schemeClr val="tx1"/>
+                </a:solidFill>
+              </a:rPr>
+              <a:t>store_menu</a:t>
+            </a:r>
+            <a:r>
+              <a:rPr lang="en-US" altLang="ko-KR" dirty="0" smtClean="0">
+                <a:solidFill>
+                  <a:schemeClr val="tx1"/>
+                </a:solidFill>
+              </a:rPr>
+              <a:t>(id))</a:t>
+            </a:r>
+          </a:p>
+          <a:p>
+            <a:pPr algn="ctr"/>
+            <a:r>
+              <a:rPr lang="en-US" altLang="ko-KR" dirty="0" smtClean="0">
+                <a:solidFill>
+                  <a:schemeClr val="tx1"/>
+                </a:solidFill>
+              </a:rPr>
+              <a:t>status varchar(50) </a:t>
+            </a:r>
+            <a:r>
+              <a:rPr lang="en-US" altLang="ko-KR" dirty="0" err="1" smtClean="0">
+                <a:solidFill>
+                  <a:schemeClr val="tx1"/>
+                </a:solidFill>
+              </a:rPr>
+              <a:t>nn</a:t>
+            </a:r>
+            <a:endParaRPr lang="ko-KR" altLang="en-US" dirty="0">
+              <a:solidFill>
+                <a:schemeClr val="tx1"/>
+              </a:solidFill>
+            </a:endParaRPr>
+          </a:p>
+        </p:txBody>
+      </p:sp>
+      <p:sp>
+        <p:nvSpPr>
+          <p:cNvPr id="8" name="직사각형 7"/>
+          <p:cNvSpPr/>
+          <p:nvPr/>
+        </p:nvSpPr>
+        <p:spPr>
+          <a:xfrm>
+            <a:off x="5960342" y="304408"/>
+            <a:ext cx="6096000" cy="2677656"/>
+          </a:xfrm>
+          <a:prstGeom prst="rect">
+            <a:avLst/>
+          </a:prstGeom>
+        </p:spPr>
+        <p:txBody>
+          <a:bodyPr>
+            <a:spAutoFit/>
+          </a:bodyPr>
+          <a:lstStyle/>
+          <a:p>
+            <a:r>
+              <a:rPr lang="en-US" altLang="ko-KR" sz="1400" dirty="0"/>
+              <a:t>CREATE TABLE </a:t>
+            </a:r>
+            <a:r>
+              <a:rPr lang="en-US" altLang="ko-KR" sz="1400" dirty="0" err="1"/>
+              <a:t>user_order</a:t>
+            </a:r>
+            <a:r>
+              <a:rPr lang="en-US" altLang="ko-KR" sz="1400" dirty="0"/>
+              <a:t> (</a:t>
+            </a:r>
+          </a:p>
+          <a:p>
+            <a:r>
+              <a:rPr lang="en-US" altLang="ko-KR" sz="1400" dirty="0"/>
+              <a:t>    id BIGINT(32) AUTO_INCREMENT PRIMARY KEY,</a:t>
+            </a:r>
+          </a:p>
+          <a:p>
+            <a:r>
+              <a:rPr lang="en-US" altLang="ko-KR" sz="1400" dirty="0"/>
+              <a:t>    </a:t>
+            </a:r>
+            <a:r>
+              <a:rPr lang="en-US" altLang="ko-KR" sz="1400" dirty="0" err="1"/>
+              <a:t>user_id</a:t>
+            </a:r>
+            <a:r>
+              <a:rPr lang="en-US" altLang="ko-KR" sz="1400" dirty="0"/>
+              <a:t> BIGINT(32) NOT NULL,</a:t>
+            </a:r>
+          </a:p>
+          <a:p>
+            <a:r>
+              <a:rPr lang="en-US" altLang="ko-KR" sz="1400" dirty="0"/>
+              <a:t>    status ENUM('REGISTERED', 'UNREGISTERED', 'ORDER', 'ACCEPT', 'COOKING', 'DELIVERY', 'RECEIVE') NOT NULL,</a:t>
+            </a:r>
+          </a:p>
+          <a:p>
+            <a:r>
+              <a:rPr lang="en-US" altLang="ko-KR" sz="1400" dirty="0"/>
+              <a:t>    amount DECIMAL(11,4) NOT NULL,</a:t>
+            </a:r>
+          </a:p>
+          <a:p>
+            <a:r>
+              <a:rPr lang="en-US" altLang="ko-KR" sz="1400" dirty="0"/>
+              <a:t>    </a:t>
+            </a:r>
+            <a:r>
+              <a:rPr lang="en-US" altLang="ko-KR" sz="1400" dirty="0" err="1"/>
+              <a:t>ordered_at</a:t>
+            </a:r>
+            <a:r>
+              <a:rPr lang="en-US" altLang="ko-KR" sz="1400" dirty="0"/>
+              <a:t> DATETIME,</a:t>
+            </a:r>
+          </a:p>
+          <a:p>
+            <a:r>
+              <a:rPr lang="en-US" altLang="ko-KR" sz="1400" dirty="0"/>
+              <a:t>    </a:t>
+            </a:r>
+            <a:r>
+              <a:rPr lang="en-US" altLang="ko-KR" sz="1400" dirty="0" err="1"/>
+              <a:t>accepted_at</a:t>
+            </a:r>
+            <a:r>
+              <a:rPr lang="en-US" altLang="ko-KR" sz="1400" dirty="0"/>
+              <a:t> DATETIME,</a:t>
+            </a:r>
+          </a:p>
+          <a:p>
+            <a:r>
+              <a:rPr lang="en-US" altLang="ko-KR" sz="1400" dirty="0"/>
+              <a:t>    </a:t>
+            </a:r>
+            <a:r>
+              <a:rPr lang="en-US" altLang="ko-KR" sz="1400" dirty="0" err="1"/>
+              <a:t>cooking_started_at</a:t>
+            </a:r>
+            <a:r>
+              <a:rPr lang="en-US" altLang="ko-KR" sz="1400" dirty="0"/>
+              <a:t> DATETIME,</a:t>
+            </a:r>
+          </a:p>
+          <a:p>
+            <a:r>
+              <a:rPr lang="en-US" altLang="ko-KR" sz="1400" dirty="0"/>
+              <a:t>    </a:t>
+            </a:r>
+            <a:r>
+              <a:rPr lang="en-US" altLang="ko-KR" sz="1400" dirty="0" err="1"/>
+              <a:t>delivery_started_at</a:t>
+            </a:r>
+            <a:r>
+              <a:rPr lang="en-US" altLang="ko-KR" sz="1400" dirty="0"/>
+              <a:t> DATETIME,</a:t>
+            </a:r>
+          </a:p>
+          <a:p>
+            <a:r>
+              <a:rPr lang="en-US" altLang="ko-KR" sz="1400" dirty="0"/>
+              <a:t>    </a:t>
+            </a:r>
+            <a:r>
+              <a:rPr lang="en-US" altLang="ko-KR" sz="1400" dirty="0" err="1"/>
+              <a:t>received_at</a:t>
+            </a:r>
+            <a:r>
+              <a:rPr lang="en-US" altLang="ko-KR" sz="1400" dirty="0"/>
+              <a:t> DATETIME</a:t>
+            </a:r>
+          </a:p>
+          <a:p>
+            <a:r>
+              <a:rPr lang="en-US" altLang="ko-KR" sz="1400" dirty="0"/>
+              <a:t>);</a:t>
+            </a:r>
+          </a:p>
+        </p:txBody>
+      </p:sp>
+      <p:sp>
+        <p:nvSpPr>
+          <p:cNvPr id="10" name="직사각형 9"/>
+          <p:cNvSpPr/>
+          <p:nvPr/>
+        </p:nvSpPr>
+        <p:spPr>
+          <a:xfrm>
+            <a:off x="5852143" y="3805481"/>
+            <a:ext cx="6204199" cy="369332"/>
+          </a:xfrm>
+          <a:prstGeom prst="rect">
+            <a:avLst/>
+          </a:prstGeom>
+        </p:spPr>
+        <p:txBody>
+          <a:bodyPr wrap="none">
+            <a:spAutoFit/>
+          </a:bodyPr>
+          <a:lstStyle/>
+          <a:p>
+            <a:r>
+              <a:rPr lang="ko-KR" altLang="en-US" dirty="0"/>
+              <a:t>CREATE INDEX </a:t>
+            </a:r>
+            <a:r>
+              <a:rPr lang="ko-KR" altLang="en-US" dirty="0" err="1" smtClean="0"/>
+              <a:t>idx</a:t>
+            </a:r>
+            <a:r>
+              <a:rPr lang="ko-KR" altLang="en-US" dirty="0" smtClean="0"/>
+              <a:t>_</a:t>
+            </a:r>
+            <a:r>
+              <a:rPr lang="en-US" altLang="ko-KR" dirty="0" err="1" smtClean="0"/>
+              <a:t>user_order</a:t>
+            </a:r>
+            <a:r>
+              <a:rPr lang="ko-KR" altLang="en-US" dirty="0" smtClean="0"/>
+              <a:t>_</a:t>
+            </a:r>
+            <a:r>
+              <a:rPr lang="ko-KR" altLang="en-US" dirty="0" err="1" smtClean="0"/>
+              <a:t>id</a:t>
+            </a:r>
+            <a:r>
+              <a:rPr lang="ko-KR" altLang="en-US" dirty="0" smtClean="0"/>
+              <a:t> </a:t>
+            </a:r>
+            <a:r>
+              <a:rPr lang="ko-KR" altLang="en-US" dirty="0"/>
+              <a:t>ON </a:t>
+            </a:r>
+            <a:r>
+              <a:rPr lang="en-US" altLang="ko-KR" dirty="0" err="1" smtClean="0"/>
+              <a:t>user_order</a:t>
+            </a:r>
+            <a:r>
+              <a:rPr lang="ko-KR" altLang="en-US" dirty="0" smtClean="0"/>
+              <a:t> (</a:t>
+            </a:r>
+            <a:r>
+              <a:rPr lang="en-US" altLang="ko-KR" dirty="0" smtClean="0"/>
+              <a:t>user</a:t>
+            </a:r>
+            <a:r>
+              <a:rPr lang="ko-KR" altLang="en-US" dirty="0" smtClean="0"/>
+              <a:t>_</a:t>
+            </a:r>
+            <a:r>
+              <a:rPr lang="ko-KR" altLang="en-US" dirty="0" err="1" smtClean="0"/>
+              <a:t>id</a:t>
+            </a:r>
+            <a:r>
+              <a:rPr lang="ko-KR" altLang="en-US" dirty="0"/>
+              <a:t>);</a:t>
+            </a:r>
+          </a:p>
+        </p:txBody>
+      </p:sp>
+      <p:sp>
+        <p:nvSpPr>
+          <p:cNvPr id="13" name="직사각형 12"/>
+          <p:cNvSpPr/>
+          <p:nvPr/>
+        </p:nvSpPr>
+        <p:spPr>
+          <a:xfrm>
+            <a:off x="5782407" y="4259566"/>
+            <a:ext cx="6096000" cy="1754326"/>
+          </a:xfrm>
+          <a:prstGeom prst="rect">
+            <a:avLst/>
+          </a:prstGeom>
+        </p:spPr>
+        <p:txBody>
+          <a:bodyPr>
+            <a:spAutoFit/>
+          </a:bodyPr>
+          <a:lstStyle/>
+          <a:p>
+            <a:r>
+              <a:rPr lang="ko-KR" altLang="en-US" dirty="0"/>
+              <a:t>CREATE TABLE </a:t>
+            </a:r>
+            <a:r>
+              <a:rPr lang="ko-KR" altLang="en-US" dirty="0" err="1"/>
+              <a:t>user_order_menu</a:t>
+            </a:r>
+            <a:r>
+              <a:rPr lang="ko-KR" altLang="en-US" dirty="0"/>
+              <a:t> (</a:t>
+            </a:r>
+          </a:p>
+          <a:p>
+            <a:r>
+              <a:rPr lang="ko-KR" altLang="en-US" dirty="0"/>
+              <a:t>    </a:t>
+            </a:r>
+            <a:r>
+              <a:rPr lang="ko-KR" altLang="en-US" dirty="0" err="1"/>
+              <a:t>id</a:t>
+            </a:r>
+            <a:r>
+              <a:rPr lang="ko-KR" altLang="en-US" dirty="0"/>
+              <a:t> BIGINT(32) AUTO_INCREMENT PRIMARY KEY,</a:t>
+            </a:r>
+          </a:p>
+          <a:p>
+            <a:r>
+              <a:rPr lang="ko-KR" altLang="en-US" dirty="0"/>
+              <a:t>    </a:t>
+            </a:r>
+            <a:r>
+              <a:rPr lang="ko-KR" altLang="en-US" dirty="0" err="1"/>
+              <a:t>user_order_id</a:t>
+            </a:r>
+            <a:r>
+              <a:rPr lang="ko-KR" altLang="en-US" dirty="0"/>
+              <a:t> BIGINT(32) NOT NULL,</a:t>
+            </a:r>
+          </a:p>
+          <a:p>
+            <a:r>
+              <a:rPr lang="ko-KR" altLang="en-US" dirty="0"/>
+              <a:t>    </a:t>
+            </a:r>
+            <a:r>
+              <a:rPr lang="ko-KR" altLang="en-US" dirty="0" err="1"/>
+              <a:t>store_menu_id</a:t>
+            </a:r>
+            <a:r>
+              <a:rPr lang="ko-KR" altLang="en-US" dirty="0"/>
+              <a:t> BIGINT(32) NOT NULL,</a:t>
+            </a:r>
+          </a:p>
+          <a:p>
+            <a:r>
+              <a:rPr lang="ko-KR" altLang="en-US" dirty="0"/>
+              <a:t> </a:t>
+            </a:r>
+            <a:r>
+              <a:rPr lang="en-US" altLang="ko-KR" dirty="0"/>
+              <a:t>status ENUM('REGISTERED', 'UNREGISTERED') NOT NULL</a:t>
+            </a:r>
+            <a:r>
+              <a:rPr lang="ko-KR" altLang="en-US" dirty="0" smtClean="0"/>
+              <a:t>);</a:t>
+            </a:r>
+            <a:endParaRPr lang="ko-KR" altLang="en-US" dirty="0"/>
+          </a:p>
+        </p:txBody>
+      </p:sp>
+      <p:sp>
+        <p:nvSpPr>
+          <p:cNvPr id="14" name="직사각형 13"/>
+          <p:cNvSpPr/>
+          <p:nvPr/>
+        </p:nvSpPr>
+        <p:spPr>
+          <a:xfrm>
+            <a:off x="5782407" y="6054582"/>
+            <a:ext cx="8244758" cy="646331"/>
+          </a:xfrm>
+          <a:prstGeom prst="rect">
+            <a:avLst/>
+          </a:prstGeom>
+        </p:spPr>
+        <p:txBody>
+          <a:bodyPr wrap="none">
+            <a:spAutoFit/>
+          </a:bodyPr>
+          <a:lstStyle/>
+          <a:p>
+            <a:r>
+              <a:rPr lang="ko-KR" altLang="en-US" dirty="0"/>
+              <a:t>CREATE INDEX </a:t>
+            </a:r>
+            <a:r>
+              <a:rPr lang="ko-KR" altLang="en-US" dirty="0" err="1" smtClean="0"/>
+              <a:t>idx</a:t>
+            </a:r>
+            <a:r>
+              <a:rPr lang="ko-KR" altLang="en-US" dirty="0" smtClean="0"/>
+              <a:t>_</a:t>
+            </a:r>
+            <a:r>
+              <a:rPr lang="en-US" altLang="ko-KR" dirty="0" err="1" smtClean="0"/>
+              <a:t>user_order_menu</a:t>
+            </a:r>
+            <a:r>
+              <a:rPr lang="ko-KR" altLang="en-US" dirty="0" smtClean="0"/>
+              <a:t>_</a:t>
+            </a:r>
+            <a:r>
+              <a:rPr lang="ko-KR" altLang="en-US" dirty="0" err="1" smtClean="0"/>
+              <a:t>id</a:t>
+            </a:r>
+            <a:r>
+              <a:rPr lang="ko-KR" altLang="en-US" dirty="0" smtClean="0"/>
+              <a:t> </a:t>
+            </a:r>
+            <a:r>
+              <a:rPr lang="ko-KR" altLang="en-US" dirty="0"/>
+              <a:t>ON </a:t>
+            </a:r>
+            <a:r>
+              <a:rPr lang="ko-KR" altLang="en-US" dirty="0" err="1"/>
+              <a:t>user_order_menu</a:t>
+            </a:r>
+            <a:r>
+              <a:rPr lang="ko-KR" altLang="en-US" dirty="0" smtClean="0"/>
+              <a:t> </a:t>
+            </a:r>
+            <a:r>
+              <a:rPr lang="ko-KR" altLang="en-US" dirty="0"/>
+              <a:t>(</a:t>
+            </a:r>
+            <a:r>
+              <a:rPr lang="ko-KR" altLang="en-US" dirty="0" err="1"/>
+              <a:t>user_order_id</a:t>
+            </a:r>
+            <a:r>
+              <a:rPr lang="ko-KR" altLang="en-US" dirty="0" smtClean="0"/>
+              <a:t>);</a:t>
+            </a:r>
+            <a:endParaRPr lang="en-US" altLang="ko-KR" dirty="0" smtClean="0"/>
+          </a:p>
+          <a:p>
+            <a:r>
+              <a:rPr lang="ko-KR" altLang="en-US" dirty="0"/>
+              <a:t>CREATE INDEX </a:t>
+            </a:r>
+            <a:r>
+              <a:rPr lang="ko-KR" altLang="en-US" dirty="0" err="1"/>
+              <a:t>idx</a:t>
+            </a:r>
+            <a:r>
+              <a:rPr lang="en-US" altLang="ko-KR" dirty="0"/>
+              <a:t>_</a:t>
+            </a:r>
+            <a:r>
+              <a:rPr lang="en-US" altLang="ko-KR" dirty="0" err="1"/>
+              <a:t>order_menu</a:t>
+            </a:r>
+            <a:r>
+              <a:rPr lang="ko-KR" altLang="en-US" dirty="0"/>
+              <a:t>_</a:t>
+            </a:r>
+            <a:r>
+              <a:rPr lang="ko-KR" altLang="en-US" dirty="0" err="1"/>
+              <a:t>id</a:t>
+            </a:r>
+            <a:r>
+              <a:rPr lang="ko-KR" altLang="en-US" dirty="0"/>
+              <a:t> ON </a:t>
+            </a:r>
+            <a:r>
+              <a:rPr lang="ko-KR" altLang="en-US" dirty="0" err="1"/>
+              <a:t>user_order_menu</a:t>
+            </a:r>
+            <a:r>
+              <a:rPr lang="ko-KR" altLang="en-US" dirty="0"/>
+              <a:t> (</a:t>
+            </a:r>
+            <a:r>
+              <a:rPr lang="ko-KR" altLang="en-US" dirty="0" err="1"/>
+              <a:t>store_menu_id</a:t>
+            </a:r>
+            <a:r>
+              <a:rPr lang="ko-KR" altLang="en-US" dirty="0" smtClean="0"/>
+              <a:t>);</a:t>
+            </a:r>
+            <a:endParaRPr lang="ko-KR" altLang="en-US" dirty="0"/>
+          </a:p>
+        </p:txBody>
+      </p:sp>
+    </p:spTree>
+    <p:extLst>
+      <p:ext uri="{BB962C8B-B14F-4D97-AF65-F5344CB8AC3E}">
+        <p14:creationId xmlns:p14="http://schemas.microsoft.com/office/powerpoint/2010/main" val="181860573"/>
+      </p:ext>
+    </p:extLst>
+  </p:cSld>
+  <p:clrMapOvr>
+    <a:masterClrMapping/>
+  </p:clrMapOvr>
+</p:sld>
+</file>
+
 <file path=ppt/theme/theme1.xml><?xml version="1.0" encoding="utf-8"?>
 <a:theme xmlns:a="http://schemas.openxmlformats.org/drawingml/2006/main" name="Office 테마">
   <a:themeElements>

</xml_diff>

<commit_message>
[2023-12-27] 가맹점 서버 개발-1
</commit_message>
<xml_diff>
--- a/도메인 개발.pptx
+++ b/도메인 개발.pptx
@@ -11,6 +11,7 @@
     <p:sldId id="260" r:id="rId5"/>
     <p:sldId id="261" r:id="rId6"/>
     <p:sldId id="262" r:id="rId7"/>
+    <p:sldId id="263" r:id="rId8"/>
   </p:sldIdLst>
   <p:sldSz cx="12192000" cy="6858000"/>
   <p:notesSz cx="6858000" cy="9144000"/>
@@ -248,7 +249,7 @@
           <a:p>
             <a:fld id="{29391789-C65B-4F6D-A5DE-6155C0F6D224}" type="datetimeFigureOut">
               <a:rPr lang="ko-KR" altLang="en-US" smtClean="0"/>
-              <a:t>2023-12-22</a:t>
+              <a:t>2023-12-27</a:t>
             </a:fld>
             <a:endParaRPr lang="ko-KR" altLang="en-US"/>
           </a:p>
@@ -418,7 +419,7 @@
           <a:p>
             <a:fld id="{29391789-C65B-4F6D-A5DE-6155C0F6D224}" type="datetimeFigureOut">
               <a:rPr lang="ko-KR" altLang="en-US" smtClean="0"/>
-              <a:t>2023-12-22</a:t>
+              <a:t>2023-12-27</a:t>
             </a:fld>
             <a:endParaRPr lang="ko-KR" altLang="en-US"/>
           </a:p>
@@ -598,7 +599,7 @@
           <a:p>
             <a:fld id="{29391789-C65B-4F6D-A5DE-6155C0F6D224}" type="datetimeFigureOut">
               <a:rPr lang="ko-KR" altLang="en-US" smtClean="0"/>
-              <a:t>2023-12-22</a:t>
+              <a:t>2023-12-27</a:t>
             </a:fld>
             <a:endParaRPr lang="ko-KR" altLang="en-US"/>
           </a:p>
@@ -768,7 +769,7 @@
           <a:p>
             <a:fld id="{29391789-C65B-4F6D-A5DE-6155C0F6D224}" type="datetimeFigureOut">
               <a:rPr lang="ko-KR" altLang="en-US" smtClean="0"/>
-              <a:t>2023-12-22</a:t>
+              <a:t>2023-12-27</a:t>
             </a:fld>
             <a:endParaRPr lang="ko-KR" altLang="en-US"/>
           </a:p>
@@ -1014,7 +1015,7 @@
           <a:p>
             <a:fld id="{29391789-C65B-4F6D-A5DE-6155C0F6D224}" type="datetimeFigureOut">
               <a:rPr lang="ko-KR" altLang="en-US" smtClean="0"/>
-              <a:t>2023-12-22</a:t>
+              <a:t>2023-12-27</a:t>
             </a:fld>
             <a:endParaRPr lang="ko-KR" altLang="en-US"/>
           </a:p>
@@ -1246,7 +1247,7 @@
           <a:p>
             <a:fld id="{29391789-C65B-4F6D-A5DE-6155C0F6D224}" type="datetimeFigureOut">
               <a:rPr lang="ko-KR" altLang="en-US" smtClean="0"/>
-              <a:t>2023-12-22</a:t>
+              <a:t>2023-12-27</a:t>
             </a:fld>
             <a:endParaRPr lang="ko-KR" altLang="en-US"/>
           </a:p>
@@ -1613,7 +1614,7 @@
           <a:p>
             <a:fld id="{29391789-C65B-4F6D-A5DE-6155C0F6D224}" type="datetimeFigureOut">
               <a:rPr lang="ko-KR" altLang="en-US" smtClean="0"/>
-              <a:t>2023-12-22</a:t>
+              <a:t>2023-12-27</a:t>
             </a:fld>
             <a:endParaRPr lang="ko-KR" altLang="en-US"/>
           </a:p>
@@ -1731,7 +1732,7 @@
           <a:p>
             <a:fld id="{29391789-C65B-4F6D-A5DE-6155C0F6D224}" type="datetimeFigureOut">
               <a:rPr lang="ko-KR" altLang="en-US" smtClean="0"/>
-              <a:t>2023-12-22</a:t>
+              <a:t>2023-12-27</a:t>
             </a:fld>
             <a:endParaRPr lang="ko-KR" altLang="en-US"/>
           </a:p>
@@ -1826,7 +1827,7 @@
           <a:p>
             <a:fld id="{29391789-C65B-4F6D-A5DE-6155C0F6D224}" type="datetimeFigureOut">
               <a:rPr lang="ko-KR" altLang="en-US" smtClean="0"/>
-              <a:t>2023-12-22</a:t>
+              <a:t>2023-12-27</a:t>
             </a:fld>
             <a:endParaRPr lang="ko-KR" altLang="en-US"/>
           </a:p>
@@ -2103,7 +2104,7 @@
           <a:p>
             <a:fld id="{29391789-C65B-4F6D-A5DE-6155C0F6D224}" type="datetimeFigureOut">
               <a:rPr lang="ko-KR" altLang="en-US" smtClean="0"/>
-              <a:t>2023-12-22</a:t>
+              <a:t>2023-12-27</a:t>
             </a:fld>
             <a:endParaRPr lang="ko-KR" altLang="en-US"/>
           </a:p>
@@ -2356,7 +2357,7 @@
           <a:p>
             <a:fld id="{29391789-C65B-4F6D-A5DE-6155C0F6D224}" type="datetimeFigureOut">
               <a:rPr lang="ko-KR" altLang="en-US" smtClean="0"/>
-              <a:t>2023-12-22</a:t>
+              <a:t>2023-12-27</a:t>
             </a:fld>
             <a:endParaRPr lang="ko-KR" altLang="en-US"/>
           </a:p>
@@ -2569,7 +2570,7 @@
           <a:p>
             <a:fld id="{29391789-C65B-4F6D-A5DE-6155C0F6D224}" type="datetimeFigureOut">
               <a:rPr lang="ko-KR" altLang="en-US" smtClean="0"/>
-              <a:t>2023-12-22</a:t>
+              <a:t>2023-12-27</a:t>
             </a:fld>
             <a:endParaRPr lang="ko-KR" altLang="en-US"/>
           </a:p>
@@ -7131,6 +7132,544 @@
 </p:sld>
 </file>
 
+<file path=ppt/slides/slide7.xml><?xml version="1.0" encoding="utf-8"?>
+<p:sld xmlns:a="http://schemas.openxmlformats.org/drawingml/2006/main" xmlns:r="http://schemas.openxmlformats.org/officeDocument/2006/relationships" xmlns:p="http://schemas.openxmlformats.org/presentationml/2006/main">
+  <p:cSld>
+    <p:spTree>
+      <p:nvGrpSpPr>
+        <p:cNvPr id="1" name=""/>
+        <p:cNvGrpSpPr/>
+        <p:nvPr/>
+      </p:nvGrpSpPr>
+      <p:grpSpPr>
+        <a:xfrm>
+          <a:off x="0" y="0"/>
+          <a:ext cx="0" cy="0"/>
+          <a:chOff x="0" y="0"/>
+          <a:chExt cx="0" cy="0"/>
+        </a:xfrm>
+      </p:grpSpPr>
+      <p:sp>
+        <p:nvSpPr>
+          <p:cNvPr id="4" name="TextBox 3"/>
+          <p:cNvSpPr txBox="1"/>
+          <p:nvPr/>
+        </p:nvSpPr>
+        <p:spPr>
+          <a:xfrm>
+            <a:off x="697117" y="362139"/>
+            <a:ext cx="877163" cy="369332"/>
+          </a:xfrm>
+          <a:prstGeom prst="rect">
+            <a:avLst/>
+          </a:prstGeom>
+          <a:noFill/>
+        </p:spPr>
+        <p:txBody>
+          <a:bodyPr wrap="none" rtlCol="0">
+            <a:spAutoFit/>
+          </a:bodyPr>
+          <a:lstStyle/>
+          <a:p>
+            <a:r>
+              <a:rPr lang="ko-KR" altLang="en-US" dirty="0" smtClean="0"/>
+              <a:t>가맹점</a:t>
+            </a:r>
+            <a:endParaRPr lang="ko-KR" altLang="en-US" dirty="0"/>
+          </a:p>
+        </p:txBody>
+      </p:sp>
+      <p:sp>
+        <p:nvSpPr>
+          <p:cNvPr id="5" name="직사각형 4"/>
+          <p:cNvSpPr/>
+          <p:nvPr/>
+        </p:nvSpPr>
+        <p:spPr>
+          <a:xfrm>
+            <a:off x="805758" y="1149790"/>
+            <a:ext cx="3186819" cy="3657600"/>
+          </a:xfrm>
+          <a:prstGeom prst="rect">
+            <a:avLst/>
+          </a:prstGeom>
+        </p:spPr>
+        <p:style>
+          <a:lnRef idx="2">
+            <a:schemeClr val="accent1">
+              <a:shade val="50000"/>
+            </a:schemeClr>
+          </a:lnRef>
+          <a:fillRef idx="1">
+            <a:schemeClr val="accent1"/>
+          </a:fillRef>
+          <a:effectRef idx="0">
+            <a:schemeClr val="accent1"/>
+          </a:effectRef>
+          <a:fontRef idx="minor">
+            <a:schemeClr val="lt1"/>
+          </a:fontRef>
+        </p:style>
+        <p:txBody>
+          <a:bodyPr rtlCol="0" anchor="ctr"/>
+          <a:lstStyle/>
+          <a:p>
+            <a:pPr algn="ctr"/>
+            <a:r>
+              <a:rPr lang="en-US" altLang="ko-KR" dirty="0" err="1" smtClean="0"/>
+              <a:t>store_user</a:t>
+            </a:r>
+            <a:endParaRPr lang="en-US" altLang="ko-KR" dirty="0" smtClean="0"/>
+          </a:p>
+          <a:p>
+            <a:pPr algn="ctr"/>
+            <a:r>
+              <a:rPr lang="en-US" altLang="ko-KR" dirty="0" smtClean="0"/>
+              <a:t>id </a:t>
+            </a:r>
+            <a:r>
+              <a:rPr lang="en-US" altLang="ko-KR" dirty="0" err="1" smtClean="0"/>
+              <a:t>bigint</a:t>
+            </a:r>
+            <a:r>
+              <a:rPr lang="en-US" altLang="ko-KR" dirty="0" smtClean="0"/>
+              <a:t>(32) </a:t>
+            </a:r>
+            <a:r>
+              <a:rPr lang="en-US" altLang="ko-KR" dirty="0" err="1" smtClean="0"/>
+              <a:t>ai</a:t>
+            </a:r>
+            <a:r>
+              <a:rPr lang="en-US" altLang="ko-KR" dirty="0" smtClean="0"/>
+              <a:t> </a:t>
+            </a:r>
+            <a:r>
+              <a:rPr lang="en-US" altLang="ko-KR" dirty="0" err="1" smtClean="0"/>
+              <a:t>pk</a:t>
+            </a:r>
+            <a:endParaRPr lang="en-US" altLang="ko-KR" dirty="0"/>
+          </a:p>
+          <a:p>
+            <a:pPr algn="ctr"/>
+            <a:r>
+              <a:rPr lang="en-US" altLang="ko-KR" dirty="0" err="1" smtClean="0"/>
+              <a:t>store_id</a:t>
+            </a:r>
+            <a:r>
+              <a:rPr lang="en-US" altLang="ko-KR" dirty="0" smtClean="0"/>
+              <a:t> </a:t>
+            </a:r>
+            <a:r>
+              <a:rPr lang="en-US" altLang="ko-KR" dirty="0" err="1" smtClean="0"/>
+              <a:t>bigint</a:t>
+            </a:r>
+            <a:r>
+              <a:rPr lang="en-US" altLang="ko-KR" dirty="0" smtClean="0"/>
+              <a:t>(32) </a:t>
+            </a:r>
+            <a:r>
+              <a:rPr lang="en-US" altLang="ko-KR" dirty="0" err="1" smtClean="0"/>
+              <a:t>fk</a:t>
+            </a:r>
+            <a:r>
+              <a:rPr lang="en-US" altLang="ko-KR" dirty="0" smtClean="0"/>
+              <a:t>(store(id)) </a:t>
+            </a:r>
+            <a:r>
+              <a:rPr lang="en-US" altLang="ko-KR" dirty="0" err="1" smtClean="0"/>
+              <a:t>nn</a:t>
+            </a:r>
+            <a:endParaRPr lang="en-US" altLang="ko-KR" dirty="0" smtClean="0"/>
+          </a:p>
+          <a:p>
+            <a:pPr algn="ctr"/>
+            <a:r>
+              <a:rPr lang="en-US" altLang="ko-KR" dirty="0" smtClean="0"/>
+              <a:t>email varchar(100) </a:t>
+            </a:r>
+            <a:r>
+              <a:rPr lang="en-US" altLang="ko-KR" dirty="0" err="1" smtClean="0"/>
+              <a:t>nn</a:t>
+            </a:r>
+            <a:endParaRPr lang="en-US" altLang="ko-KR" dirty="0" smtClean="0"/>
+          </a:p>
+          <a:p>
+            <a:pPr algn="ctr"/>
+            <a:r>
+              <a:rPr lang="en-US" altLang="ko-KR" dirty="0" smtClean="0"/>
+              <a:t>password varchar(100) </a:t>
+            </a:r>
+            <a:r>
+              <a:rPr lang="en-US" altLang="ko-KR" dirty="0" err="1" smtClean="0"/>
+              <a:t>nn</a:t>
+            </a:r>
+            <a:endParaRPr lang="en-US" altLang="ko-KR" dirty="0" smtClean="0"/>
+          </a:p>
+          <a:p>
+            <a:pPr algn="ctr"/>
+            <a:r>
+              <a:rPr lang="en-US" altLang="ko-KR" dirty="0"/>
+              <a:t>status ENUM('REGISTERED', 'UNREGISTERED') NOT NULL </a:t>
+            </a:r>
+            <a:r>
+              <a:rPr lang="en-US" altLang="ko-KR" dirty="0" smtClean="0"/>
+              <a:t>roll ENUM(‘USER’, ‘ADMIN‘, </a:t>
+            </a:r>
+            <a:r>
+              <a:rPr lang="en-US" altLang="ko-KR" dirty="0"/>
+              <a:t>‘MASTER’</a:t>
+            </a:r>
+            <a:r>
+              <a:rPr lang="en-US" altLang="ko-KR" dirty="0" smtClean="0"/>
+              <a:t>) </a:t>
+            </a:r>
+            <a:r>
+              <a:rPr lang="en-US" altLang="ko-KR" dirty="0"/>
+              <a:t>NOT NULL </a:t>
+            </a:r>
+            <a:r>
+              <a:rPr lang="en-US" altLang="ko-KR" dirty="0" err="1" smtClean="0"/>
+              <a:t>registered_at</a:t>
+            </a:r>
+            <a:r>
+              <a:rPr lang="en-US" altLang="ko-KR" dirty="0" smtClean="0"/>
+              <a:t> </a:t>
+            </a:r>
+            <a:r>
+              <a:rPr lang="en-US" altLang="ko-KR" dirty="0" err="1" smtClean="0"/>
+              <a:t>Datetime</a:t>
+            </a:r>
+            <a:endParaRPr lang="en-US" altLang="ko-KR" dirty="0"/>
+          </a:p>
+          <a:p>
+            <a:pPr algn="ctr"/>
+            <a:r>
+              <a:rPr lang="en-US" altLang="ko-KR" dirty="0" err="1" smtClean="0"/>
+              <a:t>unregistered_at</a:t>
+            </a:r>
+            <a:r>
+              <a:rPr lang="en-US" altLang="ko-KR" dirty="0" smtClean="0"/>
+              <a:t> </a:t>
+            </a:r>
+            <a:r>
+              <a:rPr lang="en-US" altLang="ko-KR" dirty="0" err="1" smtClean="0"/>
+              <a:t>Datetime</a:t>
+            </a:r>
+            <a:endParaRPr lang="en-US" altLang="ko-KR" dirty="0" smtClean="0"/>
+          </a:p>
+          <a:p>
+            <a:pPr algn="ctr"/>
+            <a:r>
+              <a:rPr lang="en-US" altLang="ko-KR" dirty="0" err="1" smtClean="0"/>
+              <a:t>last_login_at</a:t>
+            </a:r>
+            <a:r>
+              <a:rPr lang="en-US" altLang="ko-KR" dirty="0" smtClean="0"/>
+              <a:t> </a:t>
+            </a:r>
+            <a:r>
+              <a:rPr lang="en-US" altLang="ko-KR" dirty="0" err="1" smtClean="0"/>
+              <a:t>Datetime</a:t>
+            </a:r>
+            <a:endParaRPr lang="en-US" altLang="ko-KR" dirty="0" smtClean="0"/>
+          </a:p>
+        </p:txBody>
+      </p:sp>
+      <p:sp>
+        <p:nvSpPr>
+          <p:cNvPr id="6" name="직사각형 5"/>
+          <p:cNvSpPr/>
+          <p:nvPr/>
+        </p:nvSpPr>
+        <p:spPr>
+          <a:xfrm>
+            <a:off x="5410954" y="546805"/>
+            <a:ext cx="6096000" cy="3693319"/>
+          </a:xfrm>
+          <a:prstGeom prst="rect">
+            <a:avLst/>
+          </a:prstGeom>
+        </p:spPr>
+        <p:txBody>
+          <a:bodyPr>
+            <a:spAutoFit/>
+          </a:bodyPr>
+          <a:lstStyle/>
+          <a:p>
+            <a:r>
+              <a:rPr lang="ko-KR" altLang="en-US" dirty="0"/>
+              <a:t>CREATE TABLE </a:t>
+            </a:r>
+            <a:r>
+              <a:rPr lang="ko-KR" altLang="en-US" dirty="0" err="1"/>
+              <a:t>store_user</a:t>
+            </a:r>
+            <a:r>
+              <a:rPr lang="ko-KR" altLang="en-US" dirty="0"/>
+              <a:t> (</a:t>
+            </a:r>
+          </a:p>
+          <a:p>
+            <a:r>
+              <a:rPr lang="ko-KR" altLang="en-US" dirty="0"/>
+              <a:t>  </a:t>
+            </a:r>
+            <a:r>
+              <a:rPr lang="ko-KR" altLang="en-US" dirty="0" err="1"/>
+              <a:t>id</a:t>
+            </a:r>
+            <a:r>
+              <a:rPr lang="ko-KR" altLang="en-US" dirty="0"/>
+              <a:t> BIGINT(32) AUTO_INCREMENT PRIMARY KEY,</a:t>
+            </a:r>
+          </a:p>
+          <a:p>
+            <a:r>
+              <a:rPr lang="ko-KR" altLang="en-US" dirty="0"/>
+              <a:t>  </a:t>
+            </a:r>
+            <a:r>
+              <a:rPr lang="ko-KR" altLang="en-US" dirty="0" err="1"/>
+              <a:t>store_id</a:t>
+            </a:r>
+            <a:r>
+              <a:rPr lang="ko-KR" altLang="en-US" dirty="0"/>
+              <a:t> BIGINT(32) NOT NULL,</a:t>
+            </a:r>
+          </a:p>
+          <a:p>
+            <a:r>
+              <a:rPr lang="ko-KR" altLang="en-US" dirty="0"/>
+              <a:t>  </a:t>
+            </a:r>
+            <a:r>
+              <a:rPr lang="ko-KR" altLang="en-US" dirty="0" err="1"/>
+              <a:t>email</a:t>
+            </a:r>
+            <a:r>
+              <a:rPr lang="ko-KR" altLang="en-US" dirty="0"/>
+              <a:t> VARCHAR(100) NOT NULL,</a:t>
+            </a:r>
+          </a:p>
+          <a:p>
+            <a:r>
+              <a:rPr lang="ko-KR" altLang="en-US" dirty="0"/>
+              <a:t>  </a:t>
+            </a:r>
+            <a:r>
+              <a:rPr lang="ko-KR" altLang="en-US" dirty="0" err="1"/>
+              <a:t>password</a:t>
+            </a:r>
+            <a:r>
+              <a:rPr lang="ko-KR" altLang="en-US" dirty="0"/>
+              <a:t> VARCHAR(100) NOT NULL,</a:t>
+            </a:r>
+          </a:p>
+          <a:p>
+            <a:r>
+              <a:rPr lang="ko-KR" altLang="en-US" dirty="0"/>
+              <a:t>  </a:t>
+            </a:r>
+            <a:r>
+              <a:rPr lang="ko-KR" altLang="en-US" dirty="0" err="1"/>
+              <a:t>status</a:t>
+            </a:r>
+            <a:r>
+              <a:rPr lang="ko-KR" altLang="en-US" dirty="0"/>
+              <a:t> ENUM('REGISTERED', 'UNREGISTERED') NOT NULL,</a:t>
+            </a:r>
+          </a:p>
+          <a:p>
+            <a:r>
+              <a:rPr lang="ko-KR" altLang="en-US" dirty="0"/>
+              <a:t>  </a:t>
+            </a:r>
+            <a:r>
+              <a:rPr lang="ko-KR" altLang="en-US" dirty="0" err="1"/>
+              <a:t>role</a:t>
+            </a:r>
+            <a:r>
+              <a:rPr lang="ko-KR" altLang="en-US" dirty="0"/>
+              <a:t> ENUM('USER', </a:t>
+            </a:r>
+            <a:r>
+              <a:rPr lang="ko-KR" altLang="en-US" dirty="0" smtClean="0"/>
+              <a:t>'ADMIN‘</a:t>
+            </a:r>
+            <a:r>
+              <a:rPr lang="en-US" altLang="ko-KR" dirty="0" smtClean="0"/>
+              <a:t>, ‘MASTER’</a:t>
+            </a:r>
+            <a:r>
+              <a:rPr lang="ko-KR" altLang="en-US" dirty="0" smtClean="0"/>
+              <a:t>) </a:t>
+            </a:r>
+            <a:r>
+              <a:rPr lang="ko-KR" altLang="en-US" dirty="0"/>
+              <a:t>NOT NULL,</a:t>
+            </a:r>
+          </a:p>
+          <a:p>
+            <a:r>
+              <a:rPr lang="ko-KR" altLang="en-US" dirty="0"/>
+              <a:t>  </a:t>
+            </a:r>
+            <a:r>
+              <a:rPr lang="ko-KR" altLang="en-US" dirty="0" err="1"/>
+              <a:t>registered_at</a:t>
+            </a:r>
+            <a:r>
+              <a:rPr lang="ko-KR" altLang="en-US" dirty="0"/>
+              <a:t> DATETIME,</a:t>
+            </a:r>
+          </a:p>
+          <a:p>
+            <a:r>
+              <a:rPr lang="ko-KR" altLang="en-US" dirty="0"/>
+              <a:t>  </a:t>
+            </a:r>
+            <a:r>
+              <a:rPr lang="ko-KR" altLang="en-US" dirty="0" err="1"/>
+              <a:t>unregistered_at</a:t>
+            </a:r>
+            <a:r>
+              <a:rPr lang="ko-KR" altLang="en-US" dirty="0"/>
+              <a:t> DATETIME,</a:t>
+            </a:r>
+          </a:p>
+          <a:p>
+            <a:r>
+              <a:rPr lang="ko-KR" altLang="en-US" dirty="0"/>
+              <a:t>  </a:t>
+            </a:r>
+            <a:r>
+              <a:rPr lang="ko-KR" altLang="en-US" dirty="0" err="1"/>
+              <a:t>last_login_at</a:t>
+            </a:r>
+            <a:r>
+              <a:rPr lang="ko-KR" altLang="en-US" dirty="0"/>
+              <a:t> DATETIME,</a:t>
+            </a:r>
+          </a:p>
+          <a:p>
+            <a:r>
+              <a:rPr lang="ko-KR" altLang="en-US" dirty="0"/>
+              <a:t>  FOREIGN KEY (</a:t>
+            </a:r>
+            <a:r>
+              <a:rPr lang="ko-KR" altLang="en-US" dirty="0" err="1"/>
+              <a:t>store_id</a:t>
+            </a:r>
+            <a:r>
+              <a:rPr lang="ko-KR" altLang="en-US" dirty="0"/>
+              <a:t>) REFERENCES </a:t>
+            </a:r>
+            <a:r>
+              <a:rPr lang="ko-KR" altLang="en-US" dirty="0" err="1"/>
+              <a:t>store</a:t>
+            </a:r>
+            <a:r>
+              <a:rPr lang="ko-KR" altLang="en-US" dirty="0"/>
+              <a:t>(</a:t>
+            </a:r>
+            <a:r>
+              <a:rPr lang="ko-KR" altLang="en-US" dirty="0" err="1"/>
+              <a:t>id</a:t>
+            </a:r>
+            <a:r>
+              <a:rPr lang="ko-KR" altLang="en-US" dirty="0"/>
+              <a:t>)</a:t>
+            </a:r>
+          </a:p>
+          <a:p>
+            <a:r>
+              <a:rPr lang="ko-KR" altLang="en-US" dirty="0"/>
+              <a:t>);</a:t>
+            </a:r>
+          </a:p>
+        </p:txBody>
+      </p:sp>
+      <p:sp>
+        <p:nvSpPr>
+          <p:cNvPr id="8" name="직사각형 7"/>
+          <p:cNvSpPr/>
+          <p:nvPr/>
+        </p:nvSpPr>
+        <p:spPr>
+          <a:xfrm>
+            <a:off x="4704277" y="4946386"/>
+            <a:ext cx="5988371" cy="369332"/>
+          </a:xfrm>
+          <a:prstGeom prst="rect">
+            <a:avLst/>
+          </a:prstGeom>
+        </p:spPr>
+        <p:txBody>
+          <a:bodyPr wrap="none">
+            <a:spAutoFit/>
+          </a:bodyPr>
+          <a:lstStyle/>
+          <a:p>
+            <a:r>
+              <a:rPr lang="ko-KR" altLang="en-US" dirty="0"/>
+              <a:t>CREATE INDEX </a:t>
+            </a:r>
+            <a:r>
+              <a:rPr lang="ko-KR" altLang="en-US" dirty="0" err="1"/>
+              <a:t>idx_store_id</a:t>
+            </a:r>
+            <a:r>
+              <a:rPr lang="ko-KR" altLang="en-US" dirty="0"/>
+              <a:t> </a:t>
+            </a:r>
+            <a:r>
+              <a:rPr lang="ko-KR" altLang="en-US" dirty="0" err="1"/>
+              <a:t>on</a:t>
+            </a:r>
+            <a:r>
+              <a:rPr lang="ko-KR" altLang="en-US" dirty="0"/>
+              <a:t> </a:t>
+            </a:r>
+            <a:r>
+              <a:rPr lang="ko-KR" altLang="en-US" dirty="0" err="1"/>
+              <a:t>store_user</a:t>
+            </a:r>
+            <a:r>
+              <a:rPr lang="ko-KR" altLang="en-US" dirty="0"/>
+              <a:t> (</a:t>
+            </a:r>
+            <a:r>
+              <a:rPr lang="ko-KR" altLang="en-US" dirty="0" err="1"/>
+              <a:t>store_id</a:t>
+            </a:r>
+            <a:r>
+              <a:rPr lang="ko-KR" altLang="en-US" dirty="0"/>
+              <a:t> </a:t>
+            </a:r>
+            <a:r>
+              <a:rPr lang="ko-KR" altLang="en-US" dirty="0" err="1"/>
+              <a:t>asc</a:t>
+            </a:r>
+            <a:r>
+              <a:rPr lang="ko-KR" altLang="en-US" dirty="0"/>
+              <a:t>);</a:t>
+            </a:r>
+          </a:p>
+        </p:txBody>
+      </p:sp>
+    </p:spTree>
+    <p:extLst>
+      <p:ext uri="{BB962C8B-B14F-4D97-AF65-F5344CB8AC3E}">
+        <p14:creationId xmlns:p14="http://schemas.microsoft.com/office/powerpoint/2010/main" val="79579603"/>
+      </p:ext>
+    </p:extLst>
+  </p:cSld>
+  <p:clrMapOvr>
+    <a:masterClrMapping/>
+  </p:clrMapOvr>
+</p:sld>
+</file>
+
 <file path=ppt/theme/theme1.xml><?xml version="1.0" encoding="utf-8"?>
 <a:theme xmlns:a="http://schemas.openxmlformats.org/drawingml/2006/main" name="Office 테마">
   <a:themeElements>

</xml_diff>